<commit_message>
feat) ppt start cat
</commit_message>
<xml_diff>
--- a/Sys_final/SysP 기말.pptx
+++ b/Sys_final/SysP 기말.pptx
@@ -17,12 +17,13 @@
     <p:sldId id="257" r:id="rId11"/>
     <p:sldId id="271" r:id="rId12"/>
     <p:sldId id="272" r:id="rId13"/>
-    <p:sldId id="258" r:id="rId14"/>
-    <p:sldId id="262" r:id="rId15"/>
-    <p:sldId id="259" r:id="rId16"/>
-    <p:sldId id="260" r:id="rId17"/>
-    <p:sldId id="261" r:id="rId18"/>
-    <p:sldId id="263" r:id="rId19"/>
+    <p:sldId id="274" r:id="rId14"/>
+    <p:sldId id="258" r:id="rId15"/>
+    <p:sldId id="262" r:id="rId16"/>
+    <p:sldId id="259" r:id="rId17"/>
+    <p:sldId id="260" r:id="rId18"/>
+    <p:sldId id="261" r:id="rId19"/>
+    <p:sldId id="263" r:id="rId20"/>
   </p:sldIdLst>
   <p:sldSz cx="12192000" cy="6858000"/>
   <p:notesSz cx="6858000" cy="9144000"/>
@@ -4028,32 +4029,2572 @@
               <a:rPr lang="en-US" altLang="ko-KR" dirty="0" err="1"/>
               <a:t>myhead.c</a:t>
             </a:r>
+            <a:r>
+              <a:rPr lang="en-US" altLang="ko-KR" dirty="0"/>
+              <a:t> (1)</a:t>
+            </a:r>
             <a:endParaRPr lang="ko-KR" altLang="en-US" dirty="0"/>
           </a:p>
         </p:txBody>
       </p:sp>
       <p:sp>
         <p:nvSpPr>
-          <p:cNvPr id="3" name="내용 개체 틀 2">
+          <p:cNvPr id="6" name="TextBox 5">
             <a:extLst>
               <a:ext uri="{FF2B5EF4-FFF2-40B4-BE49-F238E27FC236}">
-                <a16:creationId xmlns:a16="http://schemas.microsoft.com/office/drawing/2014/main" id="{C4CFAF64-075B-0A16-B087-2DF467FAD75D}"/>
+                <a16:creationId xmlns:a16="http://schemas.microsoft.com/office/drawing/2014/main" id="{3EEE63C1-7942-9480-5571-AF4F9A6F7891}"/>
               </a:ext>
             </a:extLst>
           </p:cNvPr>
-          <p:cNvSpPr>
-            <a:spLocks noGrp="1"/>
-          </p:cNvSpPr>
-          <p:nvPr>
-            <p:ph idx="1"/>
-          </p:nvPr>
+          <p:cNvSpPr txBox="1"/>
+          <p:nvPr/>
         </p:nvSpPr>
-        <p:spPr/>
+        <p:spPr>
+          <a:xfrm>
+            <a:off x="838200" y="1414272"/>
+            <a:ext cx="6211957" cy="5016758"/>
+          </a:xfrm>
+          <a:prstGeom prst="rect">
+            <a:avLst/>
+          </a:prstGeom>
+          <a:noFill/>
+        </p:spPr>
         <p:txBody>
-          <a:bodyPr/>
+          <a:bodyPr wrap="none" rtlCol="0">
+            <a:spAutoFit/>
+          </a:bodyPr>
           <a:lstStyle/>
           <a:p>
-            <a:endParaRPr lang="ko-KR" altLang="en-US"/>
+            <a:r>
+              <a:rPr lang="en-US" altLang="ko-KR" sz="1000" dirty="0">
+                <a:solidFill>
+                  <a:srgbClr val="808080"/>
+                </a:solidFill>
+                <a:latin typeface="돋움체" panose="020B0609000101010101" pitchFamily="49" charset="-127"/>
+                <a:ea typeface="돋움체" panose="020B0609000101010101" pitchFamily="49" charset="-127"/>
+              </a:rPr>
+              <a:t>#include</a:t>
+            </a:r>
+            <a:r>
+              <a:rPr lang="en-US" altLang="ko-KR" sz="1000" dirty="0">
+                <a:solidFill>
+                  <a:srgbClr val="000000"/>
+                </a:solidFill>
+                <a:latin typeface="돋움체" panose="020B0609000101010101" pitchFamily="49" charset="-127"/>
+                <a:ea typeface="돋움체" panose="020B0609000101010101" pitchFamily="49" charset="-127"/>
+              </a:rPr>
+              <a:t> </a:t>
+            </a:r>
+            <a:r>
+              <a:rPr lang="en-US" altLang="ko-KR" sz="1000" dirty="0">
+                <a:solidFill>
+                  <a:srgbClr val="A31515"/>
+                </a:solidFill>
+                <a:latin typeface="돋움체" panose="020B0609000101010101" pitchFamily="49" charset="-127"/>
+                <a:ea typeface="돋움체" panose="020B0609000101010101" pitchFamily="49" charset="-127"/>
+              </a:rPr>
+              <a:t>&lt;</a:t>
+            </a:r>
+            <a:r>
+              <a:rPr lang="en-US" altLang="ko-KR" sz="1000" dirty="0" err="1">
+                <a:solidFill>
+                  <a:srgbClr val="A31515"/>
+                </a:solidFill>
+                <a:latin typeface="돋움체" panose="020B0609000101010101" pitchFamily="49" charset="-127"/>
+                <a:ea typeface="돋움체" panose="020B0609000101010101" pitchFamily="49" charset="-127"/>
+              </a:rPr>
+              <a:t>stdio.h</a:t>
+            </a:r>
+            <a:r>
+              <a:rPr lang="en-US" altLang="ko-KR" sz="1000" dirty="0">
+                <a:solidFill>
+                  <a:srgbClr val="A31515"/>
+                </a:solidFill>
+                <a:latin typeface="돋움체" panose="020B0609000101010101" pitchFamily="49" charset="-127"/>
+                <a:ea typeface="돋움체" panose="020B0609000101010101" pitchFamily="49" charset="-127"/>
+              </a:rPr>
+              <a:t>&gt;</a:t>
+            </a:r>
+            <a:endParaRPr lang="en-US" altLang="ko-KR" sz="1000" dirty="0">
+              <a:solidFill>
+                <a:srgbClr val="000000"/>
+              </a:solidFill>
+              <a:latin typeface="돋움체" panose="020B0609000101010101" pitchFamily="49" charset="-127"/>
+              <a:ea typeface="돋움체" panose="020B0609000101010101" pitchFamily="49" charset="-127"/>
+            </a:endParaRPr>
+          </a:p>
+          <a:p>
+            <a:r>
+              <a:rPr lang="en-US" altLang="ko-KR" sz="1000" dirty="0">
+                <a:solidFill>
+                  <a:srgbClr val="808080"/>
+                </a:solidFill>
+                <a:latin typeface="돋움체" panose="020B0609000101010101" pitchFamily="49" charset="-127"/>
+                <a:ea typeface="돋움체" panose="020B0609000101010101" pitchFamily="49" charset="-127"/>
+              </a:rPr>
+              <a:t>#include</a:t>
+            </a:r>
+            <a:r>
+              <a:rPr lang="en-US" altLang="ko-KR" sz="1000" dirty="0">
+                <a:solidFill>
+                  <a:srgbClr val="000000"/>
+                </a:solidFill>
+                <a:latin typeface="돋움체" panose="020B0609000101010101" pitchFamily="49" charset="-127"/>
+                <a:ea typeface="돋움체" panose="020B0609000101010101" pitchFamily="49" charset="-127"/>
+              </a:rPr>
+              <a:t> </a:t>
+            </a:r>
+            <a:r>
+              <a:rPr lang="en-US" altLang="ko-KR" sz="1000" dirty="0">
+                <a:solidFill>
+                  <a:srgbClr val="A31515"/>
+                </a:solidFill>
+                <a:latin typeface="돋움체" panose="020B0609000101010101" pitchFamily="49" charset="-127"/>
+                <a:ea typeface="돋움체" panose="020B0609000101010101" pitchFamily="49" charset="-127"/>
+              </a:rPr>
+              <a:t>&lt;</a:t>
+            </a:r>
+            <a:r>
+              <a:rPr lang="en-US" altLang="ko-KR" sz="1000" dirty="0" err="1">
+                <a:solidFill>
+                  <a:srgbClr val="A31515"/>
+                </a:solidFill>
+                <a:latin typeface="돋움체" panose="020B0609000101010101" pitchFamily="49" charset="-127"/>
+                <a:ea typeface="돋움체" panose="020B0609000101010101" pitchFamily="49" charset="-127"/>
+              </a:rPr>
+              <a:t>stdlib.h</a:t>
+            </a:r>
+            <a:r>
+              <a:rPr lang="en-US" altLang="ko-KR" sz="1000" dirty="0">
+                <a:solidFill>
+                  <a:srgbClr val="A31515"/>
+                </a:solidFill>
+                <a:latin typeface="돋움체" panose="020B0609000101010101" pitchFamily="49" charset="-127"/>
+                <a:ea typeface="돋움체" panose="020B0609000101010101" pitchFamily="49" charset="-127"/>
+              </a:rPr>
+              <a:t>&gt;</a:t>
+            </a:r>
+            <a:endParaRPr lang="en-US" altLang="ko-KR" sz="1000" dirty="0">
+              <a:solidFill>
+                <a:srgbClr val="000000"/>
+              </a:solidFill>
+              <a:latin typeface="돋움체" panose="020B0609000101010101" pitchFamily="49" charset="-127"/>
+              <a:ea typeface="돋움체" panose="020B0609000101010101" pitchFamily="49" charset="-127"/>
+            </a:endParaRPr>
+          </a:p>
+          <a:p>
+            <a:r>
+              <a:rPr lang="en-US" altLang="ko-KR" sz="1000" dirty="0">
+                <a:solidFill>
+                  <a:srgbClr val="808080"/>
+                </a:solidFill>
+                <a:latin typeface="돋움체" panose="020B0609000101010101" pitchFamily="49" charset="-127"/>
+                <a:ea typeface="돋움체" panose="020B0609000101010101" pitchFamily="49" charset="-127"/>
+              </a:rPr>
+              <a:t>#include</a:t>
+            </a:r>
+            <a:r>
+              <a:rPr lang="en-US" altLang="ko-KR" sz="1000" dirty="0">
+                <a:solidFill>
+                  <a:srgbClr val="000000"/>
+                </a:solidFill>
+                <a:latin typeface="돋움체" panose="020B0609000101010101" pitchFamily="49" charset="-127"/>
+                <a:ea typeface="돋움체" panose="020B0609000101010101" pitchFamily="49" charset="-127"/>
+              </a:rPr>
+              <a:t> </a:t>
+            </a:r>
+            <a:r>
+              <a:rPr lang="en-US" altLang="ko-KR" sz="1000" dirty="0">
+                <a:solidFill>
+                  <a:srgbClr val="A31515"/>
+                </a:solidFill>
+                <a:latin typeface="돋움체" panose="020B0609000101010101" pitchFamily="49" charset="-127"/>
+                <a:ea typeface="돋움체" panose="020B0609000101010101" pitchFamily="49" charset="-127"/>
+              </a:rPr>
+              <a:t>&lt;</a:t>
+            </a:r>
+            <a:r>
+              <a:rPr lang="en-US" altLang="ko-KR" sz="1000" dirty="0" err="1">
+                <a:solidFill>
+                  <a:srgbClr val="A31515"/>
+                </a:solidFill>
+                <a:latin typeface="돋움체" panose="020B0609000101010101" pitchFamily="49" charset="-127"/>
+                <a:ea typeface="돋움체" panose="020B0609000101010101" pitchFamily="49" charset="-127"/>
+              </a:rPr>
+              <a:t>unistd.h</a:t>
+            </a:r>
+            <a:r>
+              <a:rPr lang="en-US" altLang="ko-KR" sz="1000" dirty="0">
+                <a:solidFill>
+                  <a:srgbClr val="A31515"/>
+                </a:solidFill>
+                <a:latin typeface="돋움체" panose="020B0609000101010101" pitchFamily="49" charset="-127"/>
+                <a:ea typeface="돋움체" panose="020B0609000101010101" pitchFamily="49" charset="-127"/>
+              </a:rPr>
+              <a:t>&gt;</a:t>
+            </a:r>
+            <a:endParaRPr lang="en-US" altLang="ko-KR" sz="1000" dirty="0">
+              <a:solidFill>
+                <a:srgbClr val="000000"/>
+              </a:solidFill>
+              <a:latin typeface="돋움체" panose="020B0609000101010101" pitchFamily="49" charset="-127"/>
+              <a:ea typeface="돋움체" panose="020B0609000101010101" pitchFamily="49" charset="-127"/>
+            </a:endParaRPr>
+          </a:p>
+          <a:p>
+            <a:endParaRPr lang="ko-KR" altLang="en-US" sz="1000" dirty="0">
+              <a:solidFill>
+                <a:srgbClr val="000000"/>
+              </a:solidFill>
+              <a:latin typeface="돋움체" panose="020B0609000101010101" pitchFamily="49" charset="-127"/>
+              <a:ea typeface="돋움체" panose="020B0609000101010101" pitchFamily="49" charset="-127"/>
+            </a:endParaRPr>
+          </a:p>
+          <a:p>
+            <a:r>
+              <a:rPr lang="en-US" altLang="ko-KR" sz="1000" dirty="0">
+                <a:solidFill>
+                  <a:srgbClr val="808080"/>
+                </a:solidFill>
+                <a:latin typeface="돋움체" panose="020B0609000101010101" pitchFamily="49" charset="-127"/>
+                <a:ea typeface="돋움체" panose="020B0609000101010101" pitchFamily="49" charset="-127"/>
+              </a:rPr>
+              <a:t>#define</a:t>
+            </a:r>
+            <a:r>
+              <a:rPr lang="en-US" altLang="ko-KR" sz="1000" dirty="0">
+                <a:solidFill>
+                  <a:srgbClr val="000000"/>
+                </a:solidFill>
+                <a:latin typeface="돋움체" panose="020B0609000101010101" pitchFamily="49" charset="-127"/>
+                <a:ea typeface="돋움체" panose="020B0609000101010101" pitchFamily="49" charset="-127"/>
+              </a:rPr>
+              <a:t> DEFAULT_LINES 10</a:t>
+            </a:r>
+          </a:p>
+          <a:p>
+            <a:r>
+              <a:rPr lang="en-US" altLang="ko-KR" sz="1000" dirty="0">
+                <a:solidFill>
+                  <a:srgbClr val="808080"/>
+                </a:solidFill>
+                <a:latin typeface="돋움체" panose="020B0609000101010101" pitchFamily="49" charset="-127"/>
+                <a:ea typeface="돋움체" panose="020B0609000101010101" pitchFamily="49" charset="-127"/>
+              </a:rPr>
+              <a:t>#define</a:t>
+            </a:r>
+            <a:r>
+              <a:rPr lang="en-US" altLang="ko-KR" sz="1000" dirty="0">
+                <a:solidFill>
+                  <a:srgbClr val="000000"/>
+                </a:solidFill>
+                <a:latin typeface="돋움체" panose="020B0609000101010101" pitchFamily="49" charset="-127"/>
+                <a:ea typeface="돋움체" panose="020B0609000101010101" pitchFamily="49" charset="-127"/>
+              </a:rPr>
+              <a:t> DEFAULT_BYTES 0 </a:t>
+            </a:r>
+          </a:p>
+          <a:p>
+            <a:endParaRPr lang="ko-KR" altLang="en-US" sz="1000" dirty="0">
+              <a:solidFill>
+                <a:srgbClr val="000000"/>
+              </a:solidFill>
+              <a:latin typeface="돋움체" panose="020B0609000101010101" pitchFamily="49" charset="-127"/>
+              <a:ea typeface="돋움체" panose="020B0609000101010101" pitchFamily="49" charset="-127"/>
+            </a:endParaRPr>
+          </a:p>
+          <a:p>
+            <a:r>
+              <a:rPr lang="en-US" altLang="ko-KR" sz="1000" dirty="0">
+                <a:solidFill>
+                  <a:srgbClr val="0000FF"/>
+                </a:solidFill>
+                <a:latin typeface="돋움체" panose="020B0609000101010101" pitchFamily="49" charset="-127"/>
+                <a:ea typeface="돋움체" panose="020B0609000101010101" pitchFamily="49" charset="-127"/>
+              </a:rPr>
+              <a:t>int</a:t>
+            </a:r>
+            <a:r>
+              <a:rPr lang="en-US" altLang="ko-KR" sz="1000" dirty="0">
+                <a:solidFill>
+                  <a:srgbClr val="000000"/>
+                </a:solidFill>
+                <a:latin typeface="돋움체" panose="020B0609000101010101" pitchFamily="49" charset="-127"/>
+                <a:ea typeface="돋움체" panose="020B0609000101010101" pitchFamily="49" charset="-127"/>
+              </a:rPr>
+              <a:t> main(</a:t>
+            </a:r>
+            <a:r>
+              <a:rPr lang="en-US" altLang="ko-KR" sz="1000" dirty="0">
+                <a:solidFill>
+                  <a:srgbClr val="0000FF"/>
+                </a:solidFill>
+                <a:latin typeface="돋움체" panose="020B0609000101010101" pitchFamily="49" charset="-127"/>
+                <a:ea typeface="돋움체" panose="020B0609000101010101" pitchFamily="49" charset="-127"/>
+              </a:rPr>
+              <a:t>int</a:t>
+            </a:r>
+            <a:r>
+              <a:rPr lang="en-US" altLang="ko-KR" sz="1000" dirty="0">
+                <a:solidFill>
+                  <a:srgbClr val="000000"/>
+                </a:solidFill>
+                <a:latin typeface="돋움체" panose="020B0609000101010101" pitchFamily="49" charset="-127"/>
+                <a:ea typeface="돋움체" panose="020B0609000101010101" pitchFamily="49" charset="-127"/>
+              </a:rPr>
+              <a:t> </a:t>
+            </a:r>
+            <a:r>
+              <a:rPr lang="en-US" altLang="ko-KR" sz="1000" dirty="0" err="1">
+                <a:solidFill>
+                  <a:srgbClr val="000000"/>
+                </a:solidFill>
+                <a:latin typeface="돋움체" panose="020B0609000101010101" pitchFamily="49" charset="-127"/>
+                <a:ea typeface="돋움체" panose="020B0609000101010101" pitchFamily="49" charset="-127"/>
+              </a:rPr>
+              <a:t>argc</a:t>
+            </a:r>
+            <a:r>
+              <a:rPr lang="en-US" altLang="ko-KR" sz="1000" dirty="0">
+                <a:solidFill>
+                  <a:srgbClr val="000000"/>
+                </a:solidFill>
+                <a:latin typeface="돋움체" panose="020B0609000101010101" pitchFamily="49" charset="-127"/>
+                <a:ea typeface="돋움체" panose="020B0609000101010101" pitchFamily="49" charset="-127"/>
+              </a:rPr>
+              <a:t>, </a:t>
+            </a:r>
+            <a:r>
+              <a:rPr lang="en-US" altLang="ko-KR" sz="1000" dirty="0">
+                <a:solidFill>
+                  <a:srgbClr val="0000FF"/>
+                </a:solidFill>
+                <a:latin typeface="돋움체" panose="020B0609000101010101" pitchFamily="49" charset="-127"/>
+                <a:ea typeface="돋움체" panose="020B0609000101010101" pitchFamily="49" charset="-127"/>
+              </a:rPr>
+              <a:t>char</a:t>
+            </a:r>
+            <a:r>
+              <a:rPr lang="en-US" altLang="ko-KR" sz="1000" dirty="0">
+                <a:solidFill>
+                  <a:srgbClr val="000000"/>
+                </a:solidFill>
+                <a:latin typeface="돋움체" panose="020B0609000101010101" pitchFamily="49" charset="-127"/>
+                <a:ea typeface="돋움체" panose="020B0609000101010101" pitchFamily="49" charset="-127"/>
+              </a:rPr>
+              <a:t>* </a:t>
+            </a:r>
+            <a:r>
+              <a:rPr lang="en-US" altLang="ko-KR" sz="1000" dirty="0" err="1">
+                <a:solidFill>
+                  <a:srgbClr val="000000"/>
+                </a:solidFill>
+                <a:latin typeface="돋움체" panose="020B0609000101010101" pitchFamily="49" charset="-127"/>
+                <a:ea typeface="돋움체" panose="020B0609000101010101" pitchFamily="49" charset="-127"/>
+              </a:rPr>
+              <a:t>argv</a:t>
+            </a:r>
+            <a:r>
+              <a:rPr lang="en-US" altLang="ko-KR" sz="1000" dirty="0">
+                <a:solidFill>
+                  <a:srgbClr val="000000"/>
+                </a:solidFill>
+                <a:latin typeface="돋움체" panose="020B0609000101010101" pitchFamily="49" charset="-127"/>
+                <a:ea typeface="돋움체" panose="020B0609000101010101" pitchFamily="49" charset="-127"/>
+              </a:rPr>
+              <a:t>[]) {</a:t>
+            </a:r>
+          </a:p>
+          <a:p>
+            <a:r>
+              <a:rPr lang="en-US" altLang="ko-KR" sz="1000" dirty="0">
+                <a:solidFill>
+                  <a:srgbClr val="000000"/>
+                </a:solidFill>
+                <a:latin typeface="돋움체" panose="020B0609000101010101" pitchFamily="49" charset="-127"/>
+                <a:ea typeface="돋움체" panose="020B0609000101010101" pitchFamily="49" charset="-127"/>
+              </a:rPr>
+              <a:t>    </a:t>
+            </a:r>
+            <a:r>
+              <a:rPr lang="en-US" altLang="ko-KR" sz="1000" dirty="0">
+                <a:solidFill>
+                  <a:srgbClr val="0000FF"/>
+                </a:solidFill>
+                <a:latin typeface="돋움체" panose="020B0609000101010101" pitchFamily="49" charset="-127"/>
+                <a:ea typeface="돋움체" panose="020B0609000101010101" pitchFamily="49" charset="-127"/>
+              </a:rPr>
+              <a:t>int</a:t>
+            </a:r>
+            <a:r>
+              <a:rPr lang="en-US" altLang="ko-KR" sz="1000" dirty="0">
+                <a:solidFill>
+                  <a:srgbClr val="000000"/>
+                </a:solidFill>
+                <a:latin typeface="돋움체" panose="020B0609000101010101" pitchFamily="49" charset="-127"/>
+                <a:ea typeface="돋움체" panose="020B0609000101010101" pitchFamily="49" charset="-127"/>
+              </a:rPr>
+              <a:t> opt;</a:t>
+            </a:r>
+          </a:p>
+          <a:p>
+            <a:r>
+              <a:rPr lang="en-US" altLang="ko-KR" sz="1000" dirty="0">
+                <a:solidFill>
+                  <a:srgbClr val="000000"/>
+                </a:solidFill>
+                <a:latin typeface="돋움체" panose="020B0609000101010101" pitchFamily="49" charset="-127"/>
+                <a:ea typeface="돋움체" panose="020B0609000101010101" pitchFamily="49" charset="-127"/>
+              </a:rPr>
+              <a:t>    </a:t>
+            </a:r>
+            <a:r>
+              <a:rPr lang="en-US" altLang="ko-KR" sz="1000" dirty="0">
+                <a:solidFill>
+                  <a:srgbClr val="0000FF"/>
+                </a:solidFill>
+                <a:latin typeface="돋움체" panose="020B0609000101010101" pitchFamily="49" charset="-127"/>
+                <a:ea typeface="돋움체" panose="020B0609000101010101" pitchFamily="49" charset="-127"/>
+              </a:rPr>
+              <a:t>int</a:t>
+            </a:r>
+            <a:r>
+              <a:rPr lang="en-US" altLang="ko-KR" sz="1000" dirty="0">
+                <a:solidFill>
+                  <a:srgbClr val="000000"/>
+                </a:solidFill>
+                <a:latin typeface="돋움체" panose="020B0609000101010101" pitchFamily="49" charset="-127"/>
+                <a:ea typeface="돋움체" panose="020B0609000101010101" pitchFamily="49" charset="-127"/>
+              </a:rPr>
+              <a:t> </a:t>
+            </a:r>
+            <a:r>
+              <a:rPr lang="en-US" altLang="ko-KR" sz="1000" dirty="0" err="1">
+                <a:solidFill>
+                  <a:srgbClr val="000000"/>
+                </a:solidFill>
+                <a:latin typeface="돋움체" panose="020B0609000101010101" pitchFamily="49" charset="-127"/>
+                <a:ea typeface="돋움체" panose="020B0609000101010101" pitchFamily="49" charset="-127"/>
+              </a:rPr>
+              <a:t>num_lines</a:t>
+            </a:r>
+            <a:r>
+              <a:rPr lang="en-US" altLang="ko-KR" sz="1000" dirty="0">
+                <a:solidFill>
+                  <a:srgbClr val="000000"/>
+                </a:solidFill>
+                <a:latin typeface="돋움체" panose="020B0609000101010101" pitchFamily="49" charset="-127"/>
+                <a:ea typeface="돋움체" panose="020B0609000101010101" pitchFamily="49" charset="-127"/>
+              </a:rPr>
+              <a:t> = DEFAULT_LINES;</a:t>
+            </a:r>
+          </a:p>
+          <a:p>
+            <a:r>
+              <a:rPr lang="sv-SE" altLang="ko-KR" sz="1000" dirty="0">
+                <a:solidFill>
+                  <a:srgbClr val="000000"/>
+                </a:solidFill>
+                <a:latin typeface="돋움체" panose="020B0609000101010101" pitchFamily="49" charset="-127"/>
+                <a:ea typeface="돋움체" panose="020B0609000101010101" pitchFamily="49" charset="-127"/>
+              </a:rPr>
+              <a:t>    </a:t>
+            </a:r>
+            <a:r>
+              <a:rPr lang="sv-SE" altLang="ko-KR" sz="1000" dirty="0">
+                <a:solidFill>
+                  <a:srgbClr val="0000FF"/>
+                </a:solidFill>
+                <a:latin typeface="돋움체" panose="020B0609000101010101" pitchFamily="49" charset="-127"/>
+                <a:ea typeface="돋움체" panose="020B0609000101010101" pitchFamily="49" charset="-127"/>
+              </a:rPr>
+              <a:t>int</a:t>
+            </a:r>
+            <a:r>
+              <a:rPr lang="sv-SE" altLang="ko-KR" sz="1000" dirty="0">
+                <a:solidFill>
+                  <a:srgbClr val="000000"/>
+                </a:solidFill>
+                <a:latin typeface="돋움체" panose="020B0609000101010101" pitchFamily="49" charset="-127"/>
+                <a:ea typeface="돋움체" panose="020B0609000101010101" pitchFamily="49" charset="-127"/>
+              </a:rPr>
+              <a:t> num_bytes = DEFAULT_BYTES;</a:t>
+            </a:r>
+          </a:p>
+          <a:p>
+            <a:r>
+              <a:rPr lang="en-US" altLang="ko-KR" sz="1000" dirty="0">
+                <a:solidFill>
+                  <a:srgbClr val="000000"/>
+                </a:solidFill>
+                <a:latin typeface="돋움체" panose="020B0609000101010101" pitchFamily="49" charset="-127"/>
+                <a:ea typeface="돋움체" panose="020B0609000101010101" pitchFamily="49" charset="-127"/>
+              </a:rPr>
+              <a:t>    </a:t>
+            </a:r>
+            <a:r>
+              <a:rPr lang="en-US" altLang="ko-KR" sz="1000" dirty="0">
+                <a:solidFill>
+                  <a:srgbClr val="0000FF"/>
+                </a:solidFill>
+                <a:latin typeface="돋움체" panose="020B0609000101010101" pitchFamily="49" charset="-127"/>
+                <a:ea typeface="돋움체" panose="020B0609000101010101" pitchFamily="49" charset="-127"/>
+              </a:rPr>
+              <a:t>int</a:t>
+            </a:r>
+            <a:r>
+              <a:rPr lang="en-US" altLang="ko-KR" sz="1000" dirty="0">
+                <a:solidFill>
+                  <a:srgbClr val="000000"/>
+                </a:solidFill>
+                <a:latin typeface="돋움체" panose="020B0609000101010101" pitchFamily="49" charset="-127"/>
+                <a:ea typeface="돋움체" panose="020B0609000101010101" pitchFamily="49" charset="-127"/>
+              </a:rPr>
+              <a:t> </a:t>
+            </a:r>
+            <a:r>
+              <a:rPr lang="en-US" altLang="ko-KR" sz="1000" dirty="0" err="1">
+                <a:solidFill>
+                  <a:srgbClr val="000000"/>
+                </a:solidFill>
+                <a:latin typeface="돋움체" panose="020B0609000101010101" pitchFamily="49" charset="-127"/>
+                <a:ea typeface="돋움체" panose="020B0609000101010101" pitchFamily="49" charset="-127"/>
+              </a:rPr>
+              <a:t>use_lines</a:t>
+            </a:r>
+            <a:r>
+              <a:rPr lang="en-US" altLang="ko-KR" sz="1000" dirty="0">
+                <a:solidFill>
+                  <a:srgbClr val="000000"/>
+                </a:solidFill>
+                <a:latin typeface="돋움체" panose="020B0609000101010101" pitchFamily="49" charset="-127"/>
+                <a:ea typeface="돋움체" panose="020B0609000101010101" pitchFamily="49" charset="-127"/>
+              </a:rPr>
+              <a:t> = 1;</a:t>
+            </a:r>
+          </a:p>
+          <a:p>
+            <a:r>
+              <a:rPr lang="en-US" altLang="ko-KR" sz="1000" dirty="0">
+                <a:solidFill>
+                  <a:srgbClr val="000000"/>
+                </a:solidFill>
+                <a:latin typeface="돋움체" panose="020B0609000101010101" pitchFamily="49" charset="-127"/>
+                <a:ea typeface="돋움체" panose="020B0609000101010101" pitchFamily="49" charset="-127"/>
+              </a:rPr>
+              <a:t>    </a:t>
+            </a:r>
+            <a:r>
+              <a:rPr lang="en-US" altLang="ko-KR" sz="1000" dirty="0">
+                <a:solidFill>
+                  <a:srgbClr val="0000FF"/>
+                </a:solidFill>
+                <a:latin typeface="돋움체" panose="020B0609000101010101" pitchFamily="49" charset="-127"/>
+                <a:ea typeface="돋움체" panose="020B0609000101010101" pitchFamily="49" charset="-127"/>
+              </a:rPr>
+              <a:t>int</a:t>
+            </a:r>
+            <a:r>
+              <a:rPr lang="en-US" altLang="ko-KR" sz="1000" dirty="0">
+                <a:solidFill>
+                  <a:srgbClr val="000000"/>
+                </a:solidFill>
+                <a:latin typeface="돋움체" panose="020B0609000101010101" pitchFamily="49" charset="-127"/>
+                <a:ea typeface="돋움체" panose="020B0609000101010101" pitchFamily="49" charset="-127"/>
+              </a:rPr>
+              <a:t> </a:t>
+            </a:r>
+            <a:r>
+              <a:rPr lang="en-US" altLang="ko-KR" sz="1000" dirty="0" err="1">
+                <a:solidFill>
+                  <a:srgbClr val="000000"/>
+                </a:solidFill>
+                <a:latin typeface="돋움체" panose="020B0609000101010101" pitchFamily="49" charset="-127"/>
+                <a:ea typeface="돋움체" panose="020B0609000101010101" pitchFamily="49" charset="-127"/>
+              </a:rPr>
+              <a:t>quiet_mode</a:t>
+            </a:r>
+            <a:r>
+              <a:rPr lang="en-US" altLang="ko-KR" sz="1000" dirty="0">
+                <a:solidFill>
+                  <a:srgbClr val="000000"/>
+                </a:solidFill>
+                <a:latin typeface="돋움체" panose="020B0609000101010101" pitchFamily="49" charset="-127"/>
+                <a:ea typeface="돋움체" panose="020B0609000101010101" pitchFamily="49" charset="-127"/>
+              </a:rPr>
+              <a:t> = 0;</a:t>
+            </a:r>
+          </a:p>
+          <a:p>
+            <a:endParaRPr lang="ko-KR" altLang="en-US" sz="1000" dirty="0">
+              <a:solidFill>
+                <a:srgbClr val="000000"/>
+              </a:solidFill>
+              <a:latin typeface="돋움체" panose="020B0609000101010101" pitchFamily="49" charset="-127"/>
+              <a:ea typeface="돋움체" panose="020B0609000101010101" pitchFamily="49" charset="-127"/>
+            </a:endParaRPr>
+          </a:p>
+          <a:p>
+            <a:r>
+              <a:rPr lang="en-US" altLang="ko-KR" sz="1000" dirty="0">
+                <a:solidFill>
+                  <a:srgbClr val="000000"/>
+                </a:solidFill>
+                <a:latin typeface="돋움체" panose="020B0609000101010101" pitchFamily="49" charset="-127"/>
+                <a:ea typeface="돋움체" panose="020B0609000101010101" pitchFamily="49" charset="-127"/>
+              </a:rPr>
+              <a:t>    </a:t>
+            </a:r>
+            <a:r>
+              <a:rPr lang="en-US" altLang="ko-KR" sz="1000" dirty="0">
+                <a:solidFill>
+                  <a:srgbClr val="0000FF"/>
+                </a:solidFill>
+                <a:latin typeface="돋움체" panose="020B0609000101010101" pitchFamily="49" charset="-127"/>
+                <a:ea typeface="돋움체" panose="020B0609000101010101" pitchFamily="49" charset="-127"/>
+              </a:rPr>
+              <a:t>while</a:t>
+            </a:r>
+            <a:r>
+              <a:rPr lang="en-US" altLang="ko-KR" sz="1000" dirty="0">
+                <a:solidFill>
+                  <a:srgbClr val="000000"/>
+                </a:solidFill>
+                <a:latin typeface="돋움체" panose="020B0609000101010101" pitchFamily="49" charset="-127"/>
+                <a:ea typeface="돋움체" panose="020B0609000101010101" pitchFamily="49" charset="-127"/>
+              </a:rPr>
+              <a:t> ((opt = </a:t>
+            </a:r>
+            <a:r>
+              <a:rPr lang="en-US" altLang="ko-KR" sz="1000" dirty="0" err="1">
+                <a:solidFill>
+                  <a:srgbClr val="000000"/>
+                </a:solidFill>
+                <a:latin typeface="돋움체" panose="020B0609000101010101" pitchFamily="49" charset="-127"/>
+                <a:ea typeface="돋움체" panose="020B0609000101010101" pitchFamily="49" charset="-127"/>
+              </a:rPr>
+              <a:t>getopt</a:t>
+            </a:r>
+            <a:r>
+              <a:rPr lang="en-US" altLang="ko-KR" sz="1000" dirty="0">
+                <a:solidFill>
+                  <a:srgbClr val="000000"/>
+                </a:solidFill>
+                <a:latin typeface="돋움체" panose="020B0609000101010101" pitchFamily="49" charset="-127"/>
+                <a:ea typeface="돋움체" panose="020B0609000101010101" pitchFamily="49" charset="-127"/>
+              </a:rPr>
+              <a:t>(</a:t>
+            </a:r>
+            <a:r>
+              <a:rPr lang="en-US" altLang="ko-KR" sz="1000" dirty="0" err="1">
+                <a:solidFill>
+                  <a:srgbClr val="000000"/>
+                </a:solidFill>
+                <a:latin typeface="돋움체" panose="020B0609000101010101" pitchFamily="49" charset="-127"/>
+                <a:ea typeface="돋움체" panose="020B0609000101010101" pitchFamily="49" charset="-127"/>
+              </a:rPr>
+              <a:t>argc</a:t>
+            </a:r>
+            <a:r>
+              <a:rPr lang="en-US" altLang="ko-KR" sz="1000" dirty="0">
+                <a:solidFill>
+                  <a:srgbClr val="000000"/>
+                </a:solidFill>
+                <a:latin typeface="돋움체" panose="020B0609000101010101" pitchFamily="49" charset="-127"/>
+                <a:ea typeface="돋움체" panose="020B0609000101010101" pitchFamily="49" charset="-127"/>
+              </a:rPr>
+              <a:t>, </a:t>
+            </a:r>
+            <a:r>
+              <a:rPr lang="en-US" altLang="ko-KR" sz="1000" dirty="0" err="1">
+                <a:solidFill>
+                  <a:srgbClr val="000000"/>
+                </a:solidFill>
+                <a:latin typeface="돋움체" panose="020B0609000101010101" pitchFamily="49" charset="-127"/>
+                <a:ea typeface="돋움체" panose="020B0609000101010101" pitchFamily="49" charset="-127"/>
+              </a:rPr>
+              <a:t>argv</a:t>
+            </a:r>
+            <a:r>
+              <a:rPr lang="en-US" altLang="ko-KR" sz="1000" dirty="0">
+                <a:solidFill>
+                  <a:srgbClr val="000000"/>
+                </a:solidFill>
+                <a:latin typeface="돋움체" panose="020B0609000101010101" pitchFamily="49" charset="-127"/>
+                <a:ea typeface="돋움체" panose="020B0609000101010101" pitchFamily="49" charset="-127"/>
+              </a:rPr>
+              <a:t>, </a:t>
+            </a:r>
+            <a:r>
+              <a:rPr lang="en-US" altLang="ko-KR" sz="1000" dirty="0">
+                <a:solidFill>
+                  <a:srgbClr val="A31515"/>
+                </a:solidFill>
+                <a:latin typeface="돋움체" panose="020B0609000101010101" pitchFamily="49" charset="-127"/>
+                <a:ea typeface="돋움체" panose="020B0609000101010101" pitchFamily="49" charset="-127"/>
+              </a:rPr>
+              <a:t>"n:c:q"</a:t>
+            </a:r>
+            <a:r>
+              <a:rPr lang="en-US" altLang="ko-KR" sz="1000" dirty="0">
+                <a:solidFill>
+                  <a:srgbClr val="000000"/>
+                </a:solidFill>
+                <a:latin typeface="돋움체" panose="020B0609000101010101" pitchFamily="49" charset="-127"/>
+                <a:ea typeface="돋움체" panose="020B0609000101010101" pitchFamily="49" charset="-127"/>
+              </a:rPr>
+              <a:t>)) != -1) {</a:t>
+            </a:r>
+          </a:p>
+          <a:p>
+            <a:r>
+              <a:rPr lang="en-US" altLang="ko-KR" sz="1000" dirty="0">
+                <a:solidFill>
+                  <a:srgbClr val="000000"/>
+                </a:solidFill>
+                <a:latin typeface="돋움체" panose="020B0609000101010101" pitchFamily="49" charset="-127"/>
+                <a:ea typeface="돋움체" panose="020B0609000101010101" pitchFamily="49" charset="-127"/>
+              </a:rPr>
+              <a:t>        </a:t>
+            </a:r>
+            <a:r>
+              <a:rPr lang="en-US" altLang="ko-KR" sz="1000" dirty="0">
+                <a:solidFill>
+                  <a:srgbClr val="0000FF"/>
+                </a:solidFill>
+                <a:latin typeface="돋움체" panose="020B0609000101010101" pitchFamily="49" charset="-127"/>
+                <a:ea typeface="돋움체" panose="020B0609000101010101" pitchFamily="49" charset="-127"/>
+              </a:rPr>
+              <a:t>switch</a:t>
+            </a:r>
+            <a:r>
+              <a:rPr lang="en-US" altLang="ko-KR" sz="1000" dirty="0">
+                <a:solidFill>
+                  <a:srgbClr val="000000"/>
+                </a:solidFill>
+                <a:latin typeface="돋움체" panose="020B0609000101010101" pitchFamily="49" charset="-127"/>
+                <a:ea typeface="돋움체" panose="020B0609000101010101" pitchFamily="49" charset="-127"/>
+              </a:rPr>
+              <a:t> (opt) {</a:t>
+            </a:r>
+          </a:p>
+          <a:p>
+            <a:r>
+              <a:rPr lang="en-US" altLang="ko-KR" sz="1000" dirty="0">
+                <a:solidFill>
+                  <a:srgbClr val="000000"/>
+                </a:solidFill>
+                <a:latin typeface="돋움체" panose="020B0609000101010101" pitchFamily="49" charset="-127"/>
+                <a:ea typeface="돋움체" panose="020B0609000101010101" pitchFamily="49" charset="-127"/>
+              </a:rPr>
+              <a:t>        </a:t>
+            </a:r>
+            <a:r>
+              <a:rPr lang="en-US" altLang="ko-KR" sz="1000" dirty="0">
+                <a:solidFill>
+                  <a:srgbClr val="0000FF"/>
+                </a:solidFill>
+                <a:latin typeface="돋움체" panose="020B0609000101010101" pitchFamily="49" charset="-127"/>
+                <a:ea typeface="돋움체" panose="020B0609000101010101" pitchFamily="49" charset="-127"/>
+              </a:rPr>
+              <a:t>case</a:t>
+            </a:r>
+            <a:r>
+              <a:rPr lang="en-US" altLang="ko-KR" sz="1000" dirty="0">
+                <a:solidFill>
+                  <a:srgbClr val="000000"/>
+                </a:solidFill>
+                <a:latin typeface="돋움체" panose="020B0609000101010101" pitchFamily="49" charset="-127"/>
+                <a:ea typeface="돋움체" panose="020B0609000101010101" pitchFamily="49" charset="-127"/>
+              </a:rPr>
+              <a:t> </a:t>
+            </a:r>
+            <a:r>
+              <a:rPr lang="en-US" altLang="ko-KR" sz="1000" dirty="0">
+                <a:solidFill>
+                  <a:srgbClr val="A31515"/>
+                </a:solidFill>
+                <a:latin typeface="돋움체" panose="020B0609000101010101" pitchFamily="49" charset="-127"/>
+                <a:ea typeface="돋움체" panose="020B0609000101010101" pitchFamily="49" charset="-127"/>
+              </a:rPr>
+              <a:t>'n'</a:t>
+            </a:r>
+            <a:r>
+              <a:rPr lang="en-US" altLang="ko-KR" sz="1000" dirty="0">
+                <a:solidFill>
+                  <a:srgbClr val="000000"/>
+                </a:solidFill>
+                <a:latin typeface="돋움체" panose="020B0609000101010101" pitchFamily="49" charset="-127"/>
+                <a:ea typeface="돋움체" panose="020B0609000101010101" pitchFamily="49" charset="-127"/>
+              </a:rPr>
+              <a:t>:</a:t>
+            </a:r>
+          </a:p>
+          <a:p>
+            <a:r>
+              <a:rPr lang="en-US" altLang="ko-KR" sz="1000" dirty="0">
+                <a:solidFill>
+                  <a:srgbClr val="000000"/>
+                </a:solidFill>
+                <a:latin typeface="돋움체" panose="020B0609000101010101" pitchFamily="49" charset="-127"/>
+                <a:ea typeface="돋움체" panose="020B0609000101010101" pitchFamily="49" charset="-127"/>
+              </a:rPr>
+              <a:t>            </a:t>
+            </a:r>
+            <a:r>
+              <a:rPr lang="en-US" altLang="ko-KR" sz="1000" dirty="0" err="1">
+                <a:solidFill>
+                  <a:srgbClr val="000000"/>
+                </a:solidFill>
+                <a:latin typeface="돋움체" panose="020B0609000101010101" pitchFamily="49" charset="-127"/>
+                <a:ea typeface="돋움체" panose="020B0609000101010101" pitchFamily="49" charset="-127"/>
+              </a:rPr>
+              <a:t>num_lines</a:t>
+            </a:r>
+            <a:r>
+              <a:rPr lang="en-US" altLang="ko-KR" sz="1000" dirty="0">
+                <a:solidFill>
+                  <a:srgbClr val="000000"/>
+                </a:solidFill>
+                <a:latin typeface="돋움체" panose="020B0609000101010101" pitchFamily="49" charset="-127"/>
+                <a:ea typeface="돋움체" panose="020B0609000101010101" pitchFamily="49" charset="-127"/>
+              </a:rPr>
+              <a:t> = </a:t>
+            </a:r>
+            <a:r>
+              <a:rPr lang="en-US" altLang="ko-KR" sz="1000" dirty="0" err="1">
+                <a:solidFill>
+                  <a:srgbClr val="000000"/>
+                </a:solidFill>
+                <a:latin typeface="돋움체" panose="020B0609000101010101" pitchFamily="49" charset="-127"/>
+                <a:ea typeface="돋움체" panose="020B0609000101010101" pitchFamily="49" charset="-127"/>
+              </a:rPr>
+              <a:t>atoi</a:t>
+            </a:r>
+            <a:r>
+              <a:rPr lang="en-US" altLang="ko-KR" sz="1000" dirty="0">
+                <a:solidFill>
+                  <a:srgbClr val="000000"/>
+                </a:solidFill>
+                <a:latin typeface="돋움체" panose="020B0609000101010101" pitchFamily="49" charset="-127"/>
+                <a:ea typeface="돋움체" panose="020B0609000101010101" pitchFamily="49" charset="-127"/>
+              </a:rPr>
+              <a:t>(</a:t>
+            </a:r>
+            <a:r>
+              <a:rPr lang="en-US" altLang="ko-KR" sz="1000" dirty="0" err="1">
+                <a:solidFill>
+                  <a:srgbClr val="000000"/>
+                </a:solidFill>
+                <a:latin typeface="돋움체" panose="020B0609000101010101" pitchFamily="49" charset="-127"/>
+                <a:ea typeface="돋움체" panose="020B0609000101010101" pitchFamily="49" charset="-127"/>
+              </a:rPr>
+              <a:t>optarg</a:t>
+            </a:r>
+            <a:r>
+              <a:rPr lang="en-US" altLang="ko-KR" sz="1000" dirty="0">
+                <a:solidFill>
+                  <a:srgbClr val="000000"/>
+                </a:solidFill>
+                <a:latin typeface="돋움체" panose="020B0609000101010101" pitchFamily="49" charset="-127"/>
+                <a:ea typeface="돋움체" panose="020B0609000101010101" pitchFamily="49" charset="-127"/>
+              </a:rPr>
+              <a:t>);</a:t>
+            </a:r>
+          </a:p>
+          <a:p>
+            <a:r>
+              <a:rPr lang="en-US" altLang="ko-KR" sz="1000" dirty="0">
+                <a:solidFill>
+                  <a:srgbClr val="000000"/>
+                </a:solidFill>
+                <a:latin typeface="돋움체" panose="020B0609000101010101" pitchFamily="49" charset="-127"/>
+                <a:ea typeface="돋움체" panose="020B0609000101010101" pitchFamily="49" charset="-127"/>
+              </a:rPr>
+              <a:t>            </a:t>
+            </a:r>
+            <a:r>
+              <a:rPr lang="en-US" altLang="ko-KR" sz="1000" dirty="0" err="1">
+                <a:solidFill>
+                  <a:srgbClr val="000000"/>
+                </a:solidFill>
+                <a:latin typeface="돋움체" panose="020B0609000101010101" pitchFamily="49" charset="-127"/>
+                <a:ea typeface="돋움체" panose="020B0609000101010101" pitchFamily="49" charset="-127"/>
+              </a:rPr>
+              <a:t>use_lines</a:t>
+            </a:r>
+            <a:r>
+              <a:rPr lang="en-US" altLang="ko-KR" sz="1000" dirty="0">
+                <a:solidFill>
+                  <a:srgbClr val="000000"/>
+                </a:solidFill>
+                <a:latin typeface="돋움체" panose="020B0609000101010101" pitchFamily="49" charset="-127"/>
+                <a:ea typeface="돋움체" panose="020B0609000101010101" pitchFamily="49" charset="-127"/>
+              </a:rPr>
+              <a:t> = 1;</a:t>
+            </a:r>
+          </a:p>
+          <a:p>
+            <a:r>
+              <a:rPr lang="en-US" altLang="ko-KR" sz="1000" dirty="0">
+                <a:solidFill>
+                  <a:srgbClr val="000000"/>
+                </a:solidFill>
+                <a:latin typeface="돋움체" panose="020B0609000101010101" pitchFamily="49" charset="-127"/>
+                <a:ea typeface="돋움체" panose="020B0609000101010101" pitchFamily="49" charset="-127"/>
+              </a:rPr>
+              <a:t>            </a:t>
+            </a:r>
+            <a:r>
+              <a:rPr lang="en-US" altLang="ko-KR" sz="1000" dirty="0">
+                <a:solidFill>
+                  <a:srgbClr val="0000FF"/>
+                </a:solidFill>
+                <a:latin typeface="돋움체" panose="020B0609000101010101" pitchFamily="49" charset="-127"/>
+                <a:ea typeface="돋움체" panose="020B0609000101010101" pitchFamily="49" charset="-127"/>
+              </a:rPr>
+              <a:t>break</a:t>
+            </a:r>
+            <a:r>
+              <a:rPr lang="en-US" altLang="ko-KR" sz="1000" dirty="0">
+                <a:solidFill>
+                  <a:srgbClr val="000000"/>
+                </a:solidFill>
+                <a:latin typeface="돋움체" panose="020B0609000101010101" pitchFamily="49" charset="-127"/>
+                <a:ea typeface="돋움체" panose="020B0609000101010101" pitchFamily="49" charset="-127"/>
+              </a:rPr>
+              <a:t>;</a:t>
+            </a:r>
+          </a:p>
+          <a:p>
+            <a:r>
+              <a:rPr lang="en-US" altLang="ko-KR" sz="1000" dirty="0">
+                <a:solidFill>
+                  <a:srgbClr val="000000"/>
+                </a:solidFill>
+                <a:latin typeface="돋움체" panose="020B0609000101010101" pitchFamily="49" charset="-127"/>
+                <a:ea typeface="돋움체" panose="020B0609000101010101" pitchFamily="49" charset="-127"/>
+              </a:rPr>
+              <a:t>        </a:t>
+            </a:r>
+            <a:r>
+              <a:rPr lang="en-US" altLang="ko-KR" sz="1000" dirty="0">
+                <a:solidFill>
+                  <a:srgbClr val="0000FF"/>
+                </a:solidFill>
+                <a:latin typeface="돋움체" panose="020B0609000101010101" pitchFamily="49" charset="-127"/>
+                <a:ea typeface="돋움체" panose="020B0609000101010101" pitchFamily="49" charset="-127"/>
+              </a:rPr>
+              <a:t>case</a:t>
+            </a:r>
+            <a:r>
+              <a:rPr lang="en-US" altLang="ko-KR" sz="1000" dirty="0">
+                <a:solidFill>
+                  <a:srgbClr val="000000"/>
+                </a:solidFill>
+                <a:latin typeface="돋움체" panose="020B0609000101010101" pitchFamily="49" charset="-127"/>
+                <a:ea typeface="돋움체" panose="020B0609000101010101" pitchFamily="49" charset="-127"/>
+              </a:rPr>
+              <a:t> </a:t>
+            </a:r>
+            <a:r>
+              <a:rPr lang="en-US" altLang="ko-KR" sz="1000" dirty="0">
+                <a:solidFill>
+                  <a:srgbClr val="A31515"/>
+                </a:solidFill>
+                <a:latin typeface="돋움체" panose="020B0609000101010101" pitchFamily="49" charset="-127"/>
+                <a:ea typeface="돋움체" panose="020B0609000101010101" pitchFamily="49" charset="-127"/>
+              </a:rPr>
+              <a:t>'c'</a:t>
+            </a:r>
+            <a:r>
+              <a:rPr lang="en-US" altLang="ko-KR" sz="1000" dirty="0">
+                <a:solidFill>
+                  <a:srgbClr val="000000"/>
+                </a:solidFill>
+                <a:latin typeface="돋움체" panose="020B0609000101010101" pitchFamily="49" charset="-127"/>
+                <a:ea typeface="돋움체" panose="020B0609000101010101" pitchFamily="49" charset="-127"/>
+              </a:rPr>
+              <a:t>:</a:t>
+            </a:r>
+          </a:p>
+          <a:p>
+            <a:r>
+              <a:rPr lang="en-US" altLang="ko-KR" sz="1000" dirty="0">
+                <a:solidFill>
+                  <a:srgbClr val="000000"/>
+                </a:solidFill>
+                <a:latin typeface="돋움체" panose="020B0609000101010101" pitchFamily="49" charset="-127"/>
+                <a:ea typeface="돋움체" panose="020B0609000101010101" pitchFamily="49" charset="-127"/>
+              </a:rPr>
+              <a:t>            </a:t>
+            </a:r>
+            <a:r>
+              <a:rPr lang="en-US" altLang="ko-KR" sz="1000" dirty="0" err="1">
+                <a:solidFill>
+                  <a:srgbClr val="000000"/>
+                </a:solidFill>
+                <a:latin typeface="돋움체" panose="020B0609000101010101" pitchFamily="49" charset="-127"/>
+                <a:ea typeface="돋움체" panose="020B0609000101010101" pitchFamily="49" charset="-127"/>
+              </a:rPr>
+              <a:t>num_bytes</a:t>
+            </a:r>
+            <a:r>
+              <a:rPr lang="en-US" altLang="ko-KR" sz="1000" dirty="0">
+                <a:solidFill>
+                  <a:srgbClr val="000000"/>
+                </a:solidFill>
+                <a:latin typeface="돋움체" panose="020B0609000101010101" pitchFamily="49" charset="-127"/>
+                <a:ea typeface="돋움체" panose="020B0609000101010101" pitchFamily="49" charset="-127"/>
+              </a:rPr>
+              <a:t> = </a:t>
+            </a:r>
+            <a:r>
+              <a:rPr lang="en-US" altLang="ko-KR" sz="1000" dirty="0" err="1">
+                <a:solidFill>
+                  <a:srgbClr val="000000"/>
+                </a:solidFill>
+                <a:latin typeface="돋움체" panose="020B0609000101010101" pitchFamily="49" charset="-127"/>
+                <a:ea typeface="돋움체" panose="020B0609000101010101" pitchFamily="49" charset="-127"/>
+              </a:rPr>
+              <a:t>atoi</a:t>
+            </a:r>
+            <a:r>
+              <a:rPr lang="en-US" altLang="ko-KR" sz="1000" dirty="0">
+                <a:solidFill>
+                  <a:srgbClr val="000000"/>
+                </a:solidFill>
+                <a:latin typeface="돋움체" panose="020B0609000101010101" pitchFamily="49" charset="-127"/>
+                <a:ea typeface="돋움체" panose="020B0609000101010101" pitchFamily="49" charset="-127"/>
+              </a:rPr>
+              <a:t>(</a:t>
+            </a:r>
+            <a:r>
+              <a:rPr lang="en-US" altLang="ko-KR" sz="1000" dirty="0" err="1">
+                <a:solidFill>
+                  <a:srgbClr val="000000"/>
+                </a:solidFill>
+                <a:latin typeface="돋움체" panose="020B0609000101010101" pitchFamily="49" charset="-127"/>
+                <a:ea typeface="돋움체" panose="020B0609000101010101" pitchFamily="49" charset="-127"/>
+              </a:rPr>
+              <a:t>optarg</a:t>
+            </a:r>
+            <a:r>
+              <a:rPr lang="en-US" altLang="ko-KR" sz="1000" dirty="0">
+                <a:solidFill>
+                  <a:srgbClr val="000000"/>
+                </a:solidFill>
+                <a:latin typeface="돋움체" panose="020B0609000101010101" pitchFamily="49" charset="-127"/>
+                <a:ea typeface="돋움체" panose="020B0609000101010101" pitchFamily="49" charset="-127"/>
+              </a:rPr>
+              <a:t>);</a:t>
+            </a:r>
+          </a:p>
+          <a:p>
+            <a:r>
+              <a:rPr lang="en-US" altLang="ko-KR" sz="1000" dirty="0">
+                <a:solidFill>
+                  <a:srgbClr val="000000"/>
+                </a:solidFill>
+                <a:latin typeface="돋움체" panose="020B0609000101010101" pitchFamily="49" charset="-127"/>
+                <a:ea typeface="돋움체" panose="020B0609000101010101" pitchFamily="49" charset="-127"/>
+              </a:rPr>
+              <a:t>            </a:t>
+            </a:r>
+            <a:r>
+              <a:rPr lang="en-US" altLang="ko-KR" sz="1000" dirty="0" err="1">
+                <a:solidFill>
+                  <a:srgbClr val="000000"/>
+                </a:solidFill>
+                <a:latin typeface="돋움체" panose="020B0609000101010101" pitchFamily="49" charset="-127"/>
+                <a:ea typeface="돋움체" panose="020B0609000101010101" pitchFamily="49" charset="-127"/>
+              </a:rPr>
+              <a:t>use_lines</a:t>
+            </a:r>
+            <a:r>
+              <a:rPr lang="en-US" altLang="ko-KR" sz="1000" dirty="0">
+                <a:solidFill>
+                  <a:srgbClr val="000000"/>
+                </a:solidFill>
+                <a:latin typeface="돋움체" panose="020B0609000101010101" pitchFamily="49" charset="-127"/>
+                <a:ea typeface="돋움체" panose="020B0609000101010101" pitchFamily="49" charset="-127"/>
+              </a:rPr>
+              <a:t> = 0;</a:t>
+            </a:r>
+          </a:p>
+          <a:p>
+            <a:r>
+              <a:rPr lang="en-US" altLang="ko-KR" sz="1000" dirty="0">
+                <a:solidFill>
+                  <a:srgbClr val="000000"/>
+                </a:solidFill>
+                <a:latin typeface="돋움체" panose="020B0609000101010101" pitchFamily="49" charset="-127"/>
+                <a:ea typeface="돋움체" panose="020B0609000101010101" pitchFamily="49" charset="-127"/>
+              </a:rPr>
+              <a:t>            </a:t>
+            </a:r>
+            <a:r>
+              <a:rPr lang="en-US" altLang="ko-KR" sz="1000" dirty="0">
+                <a:solidFill>
+                  <a:srgbClr val="0000FF"/>
+                </a:solidFill>
+                <a:latin typeface="돋움체" panose="020B0609000101010101" pitchFamily="49" charset="-127"/>
+                <a:ea typeface="돋움체" panose="020B0609000101010101" pitchFamily="49" charset="-127"/>
+              </a:rPr>
+              <a:t>break</a:t>
+            </a:r>
+            <a:r>
+              <a:rPr lang="en-US" altLang="ko-KR" sz="1000" dirty="0">
+                <a:solidFill>
+                  <a:srgbClr val="000000"/>
+                </a:solidFill>
+                <a:latin typeface="돋움체" panose="020B0609000101010101" pitchFamily="49" charset="-127"/>
+                <a:ea typeface="돋움체" panose="020B0609000101010101" pitchFamily="49" charset="-127"/>
+              </a:rPr>
+              <a:t>;</a:t>
+            </a:r>
+          </a:p>
+          <a:p>
+            <a:r>
+              <a:rPr lang="en-US" altLang="ko-KR" sz="1000" dirty="0">
+                <a:solidFill>
+                  <a:srgbClr val="000000"/>
+                </a:solidFill>
+                <a:latin typeface="돋움체" panose="020B0609000101010101" pitchFamily="49" charset="-127"/>
+                <a:ea typeface="돋움체" panose="020B0609000101010101" pitchFamily="49" charset="-127"/>
+              </a:rPr>
+              <a:t>        </a:t>
+            </a:r>
+            <a:r>
+              <a:rPr lang="en-US" altLang="ko-KR" sz="1000" dirty="0">
+                <a:solidFill>
+                  <a:srgbClr val="0000FF"/>
+                </a:solidFill>
+                <a:latin typeface="돋움체" panose="020B0609000101010101" pitchFamily="49" charset="-127"/>
+                <a:ea typeface="돋움체" panose="020B0609000101010101" pitchFamily="49" charset="-127"/>
+              </a:rPr>
+              <a:t>case</a:t>
+            </a:r>
+            <a:r>
+              <a:rPr lang="en-US" altLang="ko-KR" sz="1000" dirty="0">
+                <a:solidFill>
+                  <a:srgbClr val="000000"/>
+                </a:solidFill>
+                <a:latin typeface="돋움체" panose="020B0609000101010101" pitchFamily="49" charset="-127"/>
+                <a:ea typeface="돋움체" panose="020B0609000101010101" pitchFamily="49" charset="-127"/>
+              </a:rPr>
+              <a:t> </a:t>
+            </a:r>
+            <a:r>
+              <a:rPr lang="en-US" altLang="ko-KR" sz="1000" dirty="0">
+                <a:solidFill>
+                  <a:srgbClr val="A31515"/>
+                </a:solidFill>
+                <a:latin typeface="돋움체" panose="020B0609000101010101" pitchFamily="49" charset="-127"/>
+                <a:ea typeface="돋움체" panose="020B0609000101010101" pitchFamily="49" charset="-127"/>
+              </a:rPr>
+              <a:t>'q'</a:t>
+            </a:r>
+            <a:r>
+              <a:rPr lang="en-US" altLang="ko-KR" sz="1000" dirty="0">
+                <a:solidFill>
+                  <a:srgbClr val="000000"/>
+                </a:solidFill>
+                <a:latin typeface="돋움체" panose="020B0609000101010101" pitchFamily="49" charset="-127"/>
+                <a:ea typeface="돋움체" panose="020B0609000101010101" pitchFamily="49" charset="-127"/>
+              </a:rPr>
+              <a:t>:</a:t>
+            </a:r>
+          </a:p>
+          <a:p>
+            <a:r>
+              <a:rPr lang="en-US" altLang="ko-KR" sz="1000" dirty="0">
+                <a:solidFill>
+                  <a:srgbClr val="000000"/>
+                </a:solidFill>
+                <a:latin typeface="돋움체" panose="020B0609000101010101" pitchFamily="49" charset="-127"/>
+                <a:ea typeface="돋움체" panose="020B0609000101010101" pitchFamily="49" charset="-127"/>
+              </a:rPr>
+              <a:t>            </a:t>
+            </a:r>
+            <a:r>
+              <a:rPr lang="en-US" altLang="ko-KR" sz="1000" dirty="0" err="1">
+                <a:solidFill>
+                  <a:srgbClr val="000000"/>
+                </a:solidFill>
+                <a:latin typeface="돋움체" panose="020B0609000101010101" pitchFamily="49" charset="-127"/>
+                <a:ea typeface="돋움체" panose="020B0609000101010101" pitchFamily="49" charset="-127"/>
+              </a:rPr>
+              <a:t>quiet_mode</a:t>
+            </a:r>
+            <a:r>
+              <a:rPr lang="en-US" altLang="ko-KR" sz="1000" dirty="0">
+                <a:solidFill>
+                  <a:srgbClr val="000000"/>
+                </a:solidFill>
+                <a:latin typeface="돋움체" panose="020B0609000101010101" pitchFamily="49" charset="-127"/>
+                <a:ea typeface="돋움체" panose="020B0609000101010101" pitchFamily="49" charset="-127"/>
+              </a:rPr>
+              <a:t> = 1;</a:t>
+            </a:r>
+          </a:p>
+          <a:p>
+            <a:r>
+              <a:rPr lang="en-US" altLang="ko-KR" sz="1000" dirty="0">
+                <a:solidFill>
+                  <a:srgbClr val="000000"/>
+                </a:solidFill>
+                <a:latin typeface="돋움체" panose="020B0609000101010101" pitchFamily="49" charset="-127"/>
+                <a:ea typeface="돋움체" panose="020B0609000101010101" pitchFamily="49" charset="-127"/>
+              </a:rPr>
+              <a:t>            </a:t>
+            </a:r>
+            <a:r>
+              <a:rPr lang="en-US" altLang="ko-KR" sz="1000" dirty="0">
+                <a:solidFill>
+                  <a:srgbClr val="0000FF"/>
+                </a:solidFill>
+                <a:latin typeface="돋움체" panose="020B0609000101010101" pitchFamily="49" charset="-127"/>
+                <a:ea typeface="돋움체" panose="020B0609000101010101" pitchFamily="49" charset="-127"/>
+              </a:rPr>
+              <a:t>break</a:t>
+            </a:r>
+            <a:r>
+              <a:rPr lang="en-US" altLang="ko-KR" sz="1000" dirty="0">
+                <a:solidFill>
+                  <a:srgbClr val="000000"/>
+                </a:solidFill>
+                <a:latin typeface="돋움체" panose="020B0609000101010101" pitchFamily="49" charset="-127"/>
+                <a:ea typeface="돋움체" panose="020B0609000101010101" pitchFamily="49" charset="-127"/>
+              </a:rPr>
+              <a:t>;</a:t>
+            </a:r>
+          </a:p>
+          <a:p>
+            <a:r>
+              <a:rPr lang="en-US" altLang="ko-KR" sz="1000" dirty="0">
+                <a:solidFill>
+                  <a:srgbClr val="000000"/>
+                </a:solidFill>
+                <a:latin typeface="돋움체" panose="020B0609000101010101" pitchFamily="49" charset="-127"/>
+                <a:ea typeface="돋움체" panose="020B0609000101010101" pitchFamily="49" charset="-127"/>
+              </a:rPr>
+              <a:t>        </a:t>
+            </a:r>
+            <a:r>
+              <a:rPr lang="en-US" altLang="ko-KR" sz="1000" dirty="0">
+                <a:solidFill>
+                  <a:srgbClr val="0000FF"/>
+                </a:solidFill>
+                <a:latin typeface="돋움체" panose="020B0609000101010101" pitchFamily="49" charset="-127"/>
+                <a:ea typeface="돋움체" panose="020B0609000101010101" pitchFamily="49" charset="-127"/>
+              </a:rPr>
+              <a:t>default</a:t>
+            </a:r>
+            <a:r>
+              <a:rPr lang="en-US" altLang="ko-KR" sz="1000" dirty="0">
+                <a:solidFill>
+                  <a:srgbClr val="000000"/>
+                </a:solidFill>
+                <a:latin typeface="돋움체" panose="020B0609000101010101" pitchFamily="49" charset="-127"/>
+                <a:ea typeface="돋움체" panose="020B0609000101010101" pitchFamily="49" charset="-127"/>
+              </a:rPr>
+              <a:t>:</a:t>
+            </a:r>
+          </a:p>
+          <a:p>
+            <a:r>
+              <a:rPr lang="pt-BR" altLang="ko-KR" sz="1000" dirty="0">
+                <a:solidFill>
+                  <a:srgbClr val="000000"/>
+                </a:solidFill>
+                <a:latin typeface="돋움체" panose="020B0609000101010101" pitchFamily="49" charset="-127"/>
+                <a:ea typeface="돋움체" panose="020B0609000101010101" pitchFamily="49" charset="-127"/>
+              </a:rPr>
+              <a:t>            fprintf(stderr, </a:t>
+            </a:r>
+            <a:r>
+              <a:rPr lang="pt-BR" altLang="ko-KR" sz="1000" dirty="0">
+                <a:solidFill>
+                  <a:srgbClr val="A31515"/>
+                </a:solidFill>
+                <a:latin typeface="돋움체" panose="020B0609000101010101" pitchFamily="49" charset="-127"/>
+                <a:ea typeface="돋움체" panose="020B0609000101010101" pitchFamily="49" charset="-127"/>
+              </a:rPr>
+              <a:t>"Usage: %s [-n num_lines] [-c num_bytes] [-q] [file]\n"</a:t>
+            </a:r>
+            <a:r>
+              <a:rPr lang="pt-BR" altLang="ko-KR" sz="1000" dirty="0">
+                <a:solidFill>
+                  <a:srgbClr val="000000"/>
+                </a:solidFill>
+                <a:latin typeface="돋움체" panose="020B0609000101010101" pitchFamily="49" charset="-127"/>
+                <a:ea typeface="돋움체" panose="020B0609000101010101" pitchFamily="49" charset="-127"/>
+              </a:rPr>
+              <a:t>, argv[0]);</a:t>
+            </a:r>
+          </a:p>
+          <a:p>
+            <a:r>
+              <a:rPr lang="en-US" altLang="ko-KR" sz="1000" dirty="0">
+                <a:solidFill>
+                  <a:srgbClr val="000000"/>
+                </a:solidFill>
+                <a:latin typeface="돋움체" panose="020B0609000101010101" pitchFamily="49" charset="-127"/>
+                <a:ea typeface="돋움체" panose="020B0609000101010101" pitchFamily="49" charset="-127"/>
+              </a:rPr>
+              <a:t>            exit(EXIT_FAILURE);</a:t>
+            </a:r>
+          </a:p>
+          <a:p>
+            <a:r>
+              <a:rPr lang="ko-KR" altLang="en-US" sz="1000" dirty="0">
+                <a:solidFill>
+                  <a:srgbClr val="000000"/>
+                </a:solidFill>
+                <a:latin typeface="돋움체" panose="020B0609000101010101" pitchFamily="49" charset="-127"/>
+                <a:ea typeface="돋움체" panose="020B0609000101010101" pitchFamily="49" charset="-127"/>
+              </a:rPr>
+              <a:t>        </a:t>
+            </a:r>
+            <a:r>
+              <a:rPr lang="en-US" altLang="ko-KR" sz="1000" dirty="0">
+                <a:solidFill>
+                  <a:srgbClr val="000000"/>
+                </a:solidFill>
+                <a:latin typeface="돋움체" panose="020B0609000101010101" pitchFamily="49" charset="-127"/>
+                <a:ea typeface="돋움체" panose="020B0609000101010101" pitchFamily="49" charset="-127"/>
+              </a:rPr>
+              <a:t>}</a:t>
+            </a:r>
+          </a:p>
+          <a:p>
+            <a:r>
+              <a:rPr lang="ko-KR" altLang="en-US" sz="1000" dirty="0">
+                <a:solidFill>
+                  <a:srgbClr val="000000"/>
+                </a:solidFill>
+                <a:latin typeface="돋움체" panose="020B0609000101010101" pitchFamily="49" charset="-127"/>
+                <a:ea typeface="돋움체" panose="020B0609000101010101" pitchFamily="49" charset="-127"/>
+              </a:rPr>
+              <a:t>    </a:t>
+            </a:r>
+            <a:r>
+              <a:rPr lang="en-US" altLang="ko-KR" sz="1000" dirty="0">
+                <a:solidFill>
+                  <a:srgbClr val="000000"/>
+                </a:solidFill>
+                <a:latin typeface="돋움체" panose="020B0609000101010101" pitchFamily="49" charset="-127"/>
+                <a:ea typeface="돋움체" panose="020B0609000101010101" pitchFamily="49" charset="-127"/>
+              </a:rPr>
+              <a:t>}</a:t>
+            </a:r>
+            <a:endParaRPr lang="ko-KR" altLang="en-US" sz="1000" dirty="0"/>
+          </a:p>
+        </p:txBody>
+      </p:sp>
+      <p:sp>
+        <p:nvSpPr>
+          <p:cNvPr id="7" name="TextBox 6">
+            <a:extLst>
+              <a:ext uri="{FF2B5EF4-FFF2-40B4-BE49-F238E27FC236}">
+                <a16:creationId xmlns:a16="http://schemas.microsoft.com/office/drawing/2014/main" id="{A26D787A-D67A-1D6D-56F1-37EE3B8FE8C0}"/>
+              </a:ext>
+            </a:extLst>
+          </p:cNvPr>
+          <p:cNvSpPr txBox="1"/>
+          <p:nvPr/>
+        </p:nvSpPr>
+        <p:spPr>
+          <a:xfrm flipH="1">
+            <a:off x="7050157" y="1414272"/>
+            <a:ext cx="4898136" cy="3631763"/>
+          </a:xfrm>
+          <a:prstGeom prst="rect">
+            <a:avLst/>
+          </a:prstGeom>
+          <a:noFill/>
+        </p:spPr>
+        <p:txBody>
+          <a:bodyPr wrap="square" rtlCol="0">
+            <a:spAutoFit/>
+          </a:bodyPr>
+          <a:lstStyle/>
+          <a:p>
+            <a:r>
+              <a:rPr lang="en-US" altLang="ko-KR" sz="1000" dirty="0">
+                <a:solidFill>
+                  <a:srgbClr val="008000"/>
+                </a:solidFill>
+                <a:latin typeface="돋움체" panose="020B0609000101010101" pitchFamily="49" charset="-127"/>
+                <a:ea typeface="돋움체" panose="020B0609000101010101" pitchFamily="49" charset="-127"/>
+              </a:rPr>
+              <a:t>// </a:t>
+            </a:r>
+            <a:r>
+              <a:rPr lang="ko-KR" altLang="en-US" sz="1000" dirty="0">
+                <a:solidFill>
+                  <a:srgbClr val="008000"/>
+                </a:solidFill>
+                <a:latin typeface="돋움체" panose="020B0609000101010101" pitchFamily="49" charset="-127"/>
+                <a:ea typeface="돋움체" panose="020B0609000101010101" pitchFamily="49" charset="-127"/>
+              </a:rPr>
+              <a:t>출력할 파일이 있을 시</a:t>
+            </a:r>
+            <a:endParaRPr lang="ko-KR" altLang="en-US" sz="1000" dirty="0">
+              <a:solidFill>
+                <a:srgbClr val="000000"/>
+              </a:solidFill>
+              <a:latin typeface="돋움체" panose="020B0609000101010101" pitchFamily="49" charset="-127"/>
+              <a:ea typeface="돋움체" panose="020B0609000101010101" pitchFamily="49" charset="-127"/>
+            </a:endParaRPr>
+          </a:p>
+          <a:p>
+            <a:r>
+              <a:rPr lang="en-US" altLang="ko-KR" sz="1000" dirty="0">
+                <a:solidFill>
+                  <a:srgbClr val="0000FF"/>
+                </a:solidFill>
+                <a:latin typeface="돋움체" panose="020B0609000101010101" pitchFamily="49" charset="-127"/>
+                <a:ea typeface="돋움체" panose="020B0609000101010101" pitchFamily="49" charset="-127"/>
+              </a:rPr>
+              <a:t>if</a:t>
+            </a:r>
+            <a:r>
+              <a:rPr lang="en-US" altLang="ko-KR" sz="1000" dirty="0">
+                <a:solidFill>
+                  <a:srgbClr val="000000"/>
+                </a:solidFill>
+                <a:latin typeface="돋움체" panose="020B0609000101010101" pitchFamily="49" charset="-127"/>
+                <a:ea typeface="돋움체" panose="020B0609000101010101" pitchFamily="49" charset="-127"/>
+              </a:rPr>
+              <a:t> (</a:t>
+            </a:r>
+            <a:r>
+              <a:rPr lang="en-US" altLang="ko-KR" sz="1000" dirty="0" err="1">
+                <a:solidFill>
+                  <a:srgbClr val="000000"/>
+                </a:solidFill>
+                <a:latin typeface="돋움체" panose="020B0609000101010101" pitchFamily="49" charset="-127"/>
+                <a:ea typeface="돋움체" panose="020B0609000101010101" pitchFamily="49" charset="-127"/>
+              </a:rPr>
+              <a:t>optind</a:t>
+            </a:r>
+            <a:r>
+              <a:rPr lang="en-US" altLang="ko-KR" sz="1000" dirty="0">
+                <a:solidFill>
+                  <a:srgbClr val="000000"/>
+                </a:solidFill>
+                <a:latin typeface="돋움체" panose="020B0609000101010101" pitchFamily="49" charset="-127"/>
+                <a:ea typeface="돋움체" panose="020B0609000101010101" pitchFamily="49" charset="-127"/>
+              </a:rPr>
+              <a:t> &lt; </a:t>
+            </a:r>
+            <a:r>
+              <a:rPr lang="en-US" altLang="ko-KR" sz="1000" dirty="0" err="1">
+                <a:solidFill>
+                  <a:srgbClr val="000000"/>
+                </a:solidFill>
+                <a:latin typeface="돋움체" panose="020B0609000101010101" pitchFamily="49" charset="-127"/>
+                <a:ea typeface="돋움체" panose="020B0609000101010101" pitchFamily="49" charset="-127"/>
+              </a:rPr>
+              <a:t>argc</a:t>
+            </a:r>
+            <a:r>
+              <a:rPr lang="en-US" altLang="ko-KR" sz="1000" dirty="0">
+                <a:solidFill>
+                  <a:srgbClr val="000000"/>
+                </a:solidFill>
+                <a:latin typeface="돋움체" panose="020B0609000101010101" pitchFamily="49" charset="-127"/>
+                <a:ea typeface="돋움체" panose="020B0609000101010101" pitchFamily="49" charset="-127"/>
+              </a:rPr>
+              <a:t>) {</a:t>
+            </a:r>
+          </a:p>
+          <a:p>
+            <a:r>
+              <a:rPr lang="en-US" altLang="ko-KR" sz="1000" dirty="0">
+                <a:solidFill>
+                  <a:srgbClr val="0000FF"/>
+                </a:solidFill>
+                <a:latin typeface="돋움체" panose="020B0609000101010101" pitchFamily="49" charset="-127"/>
+                <a:ea typeface="돋움체" panose="020B0609000101010101" pitchFamily="49" charset="-127"/>
+              </a:rPr>
+              <a:t>for</a:t>
+            </a:r>
+            <a:r>
+              <a:rPr lang="en-US" altLang="ko-KR" sz="1000" dirty="0">
+                <a:solidFill>
+                  <a:srgbClr val="000000"/>
+                </a:solidFill>
+                <a:latin typeface="돋움체" panose="020B0609000101010101" pitchFamily="49" charset="-127"/>
+                <a:ea typeface="돋움체" panose="020B0609000101010101" pitchFamily="49" charset="-127"/>
+              </a:rPr>
+              <a:t> (</a:t>
+            </a:r>
+            <a:r>
+              <a:rPr lang="en-US" altLang="ko-KR" sz="1000" dirty="0">
+                <a:solidFill>
+                  <a:srgbClr val="0000FF"/>
+                </a:solidFill>
+                <a:latin typeface="돋움체" panose="020B0609000101010101" pitchFamily="49" charset="-127"/>
+                <a:ea typeface="돋움체" panose="020B0609000101010101" pitchFamily="49" charset="-127"/>
+              </a:rPr>
+              <a:t>int</a:t>
+            </a:r>
+            <a:r>
+              <a:rPr lang="en-US" altLang="ko-KR" sz="1000" dirty="0">
+                <a:solidFill>
+                  <a:srgbClr val="000000"/>
+                </a:solidFill>
+                <a:latin typeface="돋움체" panose="020B0609000101010101" pitchFamily="49" charset="-127"/>
+                <a:ea typeface="돋움체" panose="020B0609000101010101" pitchFamily="49" charset="-127"/>
+              </a:rPr>
+              <a:t> </a:t>
+            </a:r>
+            <a:r>
+              <a:rPr lang="en-US" altLang="ko-KR" sz="1000" dirty="0" err="1">
+                <a:solidFill>
+                  <a:srgbClr val="000000"/>
+                </a:solidFill>
+                <a:latin typeface="돋움체" panose="020B0609000101010101" pitchFamily="49" charset="-127"/>
+                <a:ea typeface="돋움체" panose="020B0609000101010101" pitchFamily="49" charset="-127"/>
+              </a:rPr>
+              <a:t>i</a:t>
+            </a:r>
+            <a:r>
+              <a:rPr lang="en-US" altLang="ko-KR" sz="1000" dirty="0">
+                <a:solidFill>
+                  <a:srgbClr val="000000"/>
+                </a:solidFill>
+                <a:latin typeface="돋움체" panose="020B0609000101010101" pitchFamily="49" charset="-127"/>
+                <a:ea typeface="돋움체" panose="020B0609000101010101" pitchFamily="49" charset="-127"/>
+              </a:rPr>
+              <a:t> = </a:t>
+            </a:r>
+            <a:r>
+              <a:rPr lang="en-US" altLang="ko-KR" sz="1000" dirty="0" err="1">
+                <a:solidFill>
+                  <a:srgbClr val="000000"/>
+                </a:solidFill>
+                <a:latin typeface="돋움체" panose="020B0609000101010101" pitchFamily="49" charset="-127"/>
+                <a:ea typeface="돋움체" panose="020B0609000101010101" pitchFamily="49" charset="-127"/>
+              </a:rPr>
+              <a:t>optind</a:t>
+            </a:r>
+            <a:r>
+              <a:rPr lang="en-US" altLang="ko-KR" sz="1000" dirty="0">
+                <a:solidFill>
+                  <a:srgbClr val="000000"/>
+                </a:solidFill>
+                <a:latin typeface="돋움체" panose="020B0609000101010101" pitchFamily="49" charset="-127"/>
+                <a:ea typeface="돋움체" panose="020B0609000101010101" pitchFamily="49" charset="-127"/>
+              </a:rPr>
+              <a:t>; </a:t>
+            </a:r>
+            <a:r>
+              <a:rPr lang="en-US" altLang="ko-KR" sz="1000" dirty="0" err="1">
+                <a:solidFill>
+                  <a:srgbClr val="000000"/>
+                </a:solidFill>
+                <a:latin typeface="돋움체" panose="020B0609000101010101" pitchFamily="49" charset="-127"/>
+                <a:ea typeface="돋움체" panose="020B0609000101010101" pitchFamily="49" charset="-127"/>
+              </a:rPr>
+              <a:t>i</a:t>
+            </a:r>
+            <a:r>
+              <a:rPr lang="en-US" altLang="ko-KR" sz="1000" dirty="0">
+                <a:solidFill>
+                  <a:srgbClr val="000000"/>
+                </a:solidFill>
+                <a:latin typeface="돋움체" panose="020B0609000101010101" pitchFamily="49" charset="-127"/>
+                <a:ea typeface="돋움체" panose="020B0609000101010101" pitchFamily="49" charset="-127"/>
+              </a:rPr>
+              <a:t> &lt; </a:t>
+            </a:r>
+            <a:r>
+              <a:rPr lang="en-US" altLang="ko-KR" sz="1000" dirty="0" err="1">
+                <a:solidFill>
+                  <a:srgbClr val="000000"/>
+                </a:solidFill>
+                <a:latin typeface="돋움체" panose="020B0609000101010101" pitchFamily="49" charset="-127"/>
+                <a:ea typeface="돋움체" panose="020B0609000101010101" pitchFamily="49" charset="-127"/>
+              </a:rPr>
+              <a:t>argc</a:t>
+            </a:r>
+            <a:r>
+              <a:rPr lang="en-US" altLang="ko-KR" sz="1000" dirty="0">
+                <a:solidFill>
+                  <a:srgbClr val="000000"/>
+                </a:solidFill>
+                <a:latin typeface="돋움체" panose="020B0609000101010101" pitchFamily="49" charset="-127"/>
+                <a:ea typeface="돋움체" panose="020B0609000101010101" pitchFamily="49" charset="-127"/>
+              </a:rPr>
+              <a:t>; </a:t>
+            </a:r>
+            <a:r>
+              <a:rPr lang="en-US" altLang="ko-KR" sz="1000" dirty="0" err="1">
+                <a:solidFill>
+                  <a:srgbClr val="000000"/>
+                </a:solidFill>
+                <a:latin typeface="돋움체" panose="020B0609000101010101" pitchFamily="49" charset="-127"/>
+                <a:ea typeface="돋움체" panose="020B0609000101010101" pitchFamily="49" charset="-127"/>
+              </a:rPr>
+              <a:t>i</a:t>
+            </a:r>
+            <a:r>
+              <a:rPr lang="en-US" altLang="ko-KR" sz="1000" dirty="0">
+                <a:solidFill>
+                  <a:srgbClr val="000000"/>
+                </a:solidFill>
+                <a:latin typeface="돋움체" panose="020B0609000101010101" pitchFamily="49" charset="-127"/>
+                <a:ea typeface="돋움체" panose="020B0609000101010101" pitchFamily="49" charset="-127"/>
+              </a:rPr>
+              <a:t>++) {</a:t>
+            </a:r>
+          </a:p>
+          <a:p>
+            <a:r>
+              <a:rPr lang="en-US" altLang="ko-KR" sz="1000" dirty="0">
+                <a:solidFill>
+                  <a:srgbClr val="008000"/>
+                </a:solidFill>
+                <a:latin typeface="돋움체" panose="020B0609000101010101" pitchFamily="49" charset="-127"/>
+                <a:ea typeface="돋움체" panose="020B0609000101010101" pitchFamily="49" charset="-127"/>
+              </a:rPr>
+              <a:t>// </a:t>
+            </a:r>
+            <a:r>
+              <a:rPr lang="en-US" altLang="ko-KR" sz="1000" dirty="0" err="1">
+                <a:solidFill>
+                  <a:srgbClr val="008000"/>
+                </a:solidFill>
+                <a:latin typeface="돋움체" panose="020B0609000101010101" pitchFamily="49" charset="-127"/>
+                <a:ea typeface="돋움체" panose="020B0609000101010101" pitchFamily="49" charset="-127"/>
+              </a:rPr>
+              <a:t>argv</a:t>
+            </a:r>
+            <a:r>
+              <a:rPr lang="en-US" altLang="ko-KR" sz="1000" dirty="0">
+                <a:solidFill>
+                  <a:srgbClr val="008000"/>
+                </a:solidFill>
+                <a:latin typeface="돋움체" panose="020B0609000101010101" pitchFamily="49" charset="-127"/>
+                <a:ea typeface="돋움체" panose="020B0609000101010101" pitchFamily="49" charset="-127"/>
+              </a:rPr>
+              <a:t>[</a:t>
+            </a:r>
+            <a:r>
+              <a:rPr lang="en-US" altLang="ko-KR" sz="1000" dirty="0" err="1">
+                <a:solidFill>
+                  <a:srgbClr val="008000"/>
+                </a:solidFill>
+                <a:latin typeface="돋움체" panose="020B0609000101010101" pitchFamily="49" charset="-127"/>
+                <a:ea typeface="돋움체" panose="020B0609000101010101" pitchFamily="49" charset="-127"/>
+              </a:rPr>
+              <a:t>i</a:t>
+            </a:r>
+            <a:r>
+              <a:rPr lang="en-US" altLang="ko-KR" sz="1000" dirty="0">
+                <a:solidFill>
+                  <a:srgbClr val="008000"/>
+                </a:solidFill>
+                <a:latin typeface="돋움체" panose="020B0609000101010101" pitchFamily="49" charset="-127"/>
+                <a:ea typeface="돋움체" panose="020B0609000101010101" pitchFamily="49" charset="-127"/>
+              </a:rPr>
+              <a:t>]</a:t>
+            </a:r>
+            <a:r>
+              <a:rPr lang="ko-KR" altLang="en-US" sz="1000" dirty="0">
+                <a:solidFill>
+                  <a:srgbClr val="008000"/>
+                </a:solidFill>
+                <a:latin typeface="돋움체" panose="020B0609000101010101" pitchFamily="49" charset="-127"/>
+                <a:ea typeface="돋움체" panose="020B0609000101010101" pitchFamily="49" charset="-127"/>
+              </a:rPr>
+              <a:t>를 </a:t>
+            </a:r>
+            <a:r>
+              <a:rPr lang="en-US" altLang="ko-KR" sz="1000" dirty="0">
+                <a:solidFill>
+                  <a:srgbClr val="008000"/>
+                </a:solidFill>
+                <a:latin typeface="돋움체" panose="020B0609000101010101" pitchFamily="49" charset="-127"/>
+                <a:ea typeface="돋움체" panose="020B0609000101010101" pitchFamily="49" charset="-127"/>
+              </a:rPr>
+              <a:t>r</a:t>
+            </a:r>
+            <a:r>
+              <a:rPr lang="ko-KR" altLang="en-US" sz="1000" dirty="0">
+                <a:solidFill>
+                  <a:srgbClr val="008000"/>
+                </a:solidFill>
+                <a:latin typeface="돋움체" panose="020B0609000101010101" pitchFamily="49" charset="-127"/>
+                <a:ea typeface="돋움체" panose="020B0609000101010101" pitchFamily="49" charset="-127"/>
+              </a:rPr>
+              <a:t>모드로 열고 </a:t>
+            </a:r>
+            <a:r>
+              <a:rPr lang="en-US" altLang="ko-KR" sz="1000" dirty="0">
+                <a:solidFill>
+                  <a:srgbClr val="008000"/>
+                </a:solidFill>
+                <a:latin typeface="돋움체" panose="020B0609000101010101" pitchFamily="49" charset="-127"/>
+                <a:ea typeface="돋움체" panose="020B0609000101010101" pitchFamily="49" charset="-127"/>
+              </a:rPr>
+              <a:t>file</a:t>
+            </a:r>
+            <a:r>
+              <a:rPr lang="ko-KR" altLang="en-US" sz="1000" dirty="0">
+                <a:solidFill>
+                  <a:srgbClr val="008000"/>
+                </a:solidFill>
+                <a:latin typeface="돋움체" panose="020B0609000101010101" pitchFamily="49" charset="-127"/>
+                <a:ea typeface="돋움체" panose="020B0609000101010101" pitchFamily="49" charset="-127"/>
+              </a:rPr>
+              <a:t>에 저장</a:t>
+            </a:r>
+            <a:endParaRPr lang="ko-KR" altLang="en-US" sz="1000" dirty="0">
+              <a:solidFill>
+                <a:srgbClr val="000000"/>
+              </a:solidFill>
+              <a:latin typeface="돋움체" panose="020B0609000101010101" pitchFamily="49" charset="-127"/>
+              <a:ea typeface="돋움체" panose="020B0609000101010101" pitchFamily="49" charset="-127"/>
+            </a:endParaRPr>
+          </a:p>
+          <a:p>
+            <a:r>
+              <a:rPr lang="nn-NO" altLang="ko-KR" sz="1000" dirty="0">
+                <a:solidFill>
+                  <a:srgbClr val="000000"/>
+                </a:solidFill>
+                <a:latin typeface="돋움체" panose="020B0609000101010101" pitchFamily="49" charset="-127"/>
+                <a:ea typeface="돋움체" panose="020B0609000101010101" pitchFamily="49" charset="-127"/>
+              </a:rPr>
+              <a:t>FILE* file = fopen(argv[i], </a:t>
+            </a:r>
+            <a:r>
+              <a:rPr lang="nn-NO" altLang="ko-KR" sz="1000" dirty="0">
+                <a:solidFill>
+                  <a:srgbClr val="A31515"/>
+                </a:solidFill>
+                <a:latin typeface="돋움체" panose="020B0609000101010101" pitchFamily="49" charset="-127"/>
+                <a:ea typeface="돋움체" panose="020B0609000101010101" pitchFamily="49" charset="-127"/>
+              </a:rPr>
+              <a:t>"r"</a:t>
+            </a:r>
+            <a:r>
+              <a:rPr lang="nn-NO" altLang="ko-KR" sz="1000" dirty="0">
+                <a:solidFill>
+                  <a:srgbClr val="000000"/>
+                </a:solidFill>
+                <a:latin typeface="돋움체" panose="020B0609000101010101" pitchFamily="49" charset="-127"/>
+                <a:ea typeface="돋움체" panose="020B0609000101010101" pitchFamily="49" charset="-127"/>
+              </a:rPr>
+              <a:t>);</a:t>
+            </a:r>
+          </a:p>
+          <a:p>
+            <a:r>
+              <a:rPr lang="en-US" altLang="ko-KR" sz="1000" dirty="0">
+                <a:solidFill>
+                  <a:srgbClr val="0000FF"/>
+                </a:solidFill>
+                <a:latin typeface="돋움체" panose="020B0609000101010101" pitchFamily="49" charset="-127"/>
+                <a:ea typeface="돋움체" panose="020B0609000101010101" pitchFamily="49" charset="-127"/>
+              </a:rPr>
+              <a:t>if</a:t>
+            </a:r>
+            <a:r>
+              <a:rPr lang="en-US" altLang="ko-KR" sz="1000" dirty="0">
+                <a:solidFill>
+                  <a:srgbClr val="000000"/>
+                </a:solidFill>
+                <a:latin typeface="돋움체" panose="020B0609000101010101" pitchFamily="49" charset="-127"/>
+                <a:ea typeface="돋움체" panose="020B0609000101010101" pitchFamily="49" charset="-127"/>
+              </a:rPr>
+              <a:t> (file == NULL) {</a:t>
+            </a:r>
+          </a:p>
+          <a:p>
+            <a:r>
+              <a:rPr lang="en-US" altLang="ko-KR" sz="1000" dirty="0" err="1">
+                <a:solidFill>
+                  <a:srgbClr val="000000"/>
+                </a:solidFill>
+                <a:latin typeface="돋움체" panose="020B0609000101010101" pitchFamily="49" charset="-127"/>
+                <a:ea typeface="돋움체" panose="020B0609000101010101" pitchFamily="49" charset="-127"/>
+              </a:rPr>
+              <a:t>perror</a:t>
+            </a:r>
+            <a:r>
+              <a:rPr lang="en-US" altLang="ko-KR" sz="1000" dirty="0">
+                <a:solidFill>
+                  <a:srgbClr val="000000"/>
+                </a:solidFill>
+                <a:latin typeface="돋움체" panose="020B0609000101010101" pitchFamily="49" charset="-127"/>
+                <a:ea typeface="돋움체" panose="020B0609000101010101" pitchFamily="49" charset="-127"/>
+              </a:rPr>
+              <a:t>(</a:t>
+            </a:r>
+            <a:r>
+              <a:rPr lang="en-US" altLang="ko-KR" sz="1000" dirty="0">
+                <a:solidFill>
+                  <a:srgbClr val="A31515"/>
+                </a:solidFill>
+                <a:latin typeface="돋움체" panose="020B0609000101010101" pitchFamily="49" charset="-127"/>
+                <a:ea typeface="돋움체" panose="020B0609000101010101" pitchFamily="49" charset="-127"/>
+              </a:rPr>
+              <a:t>"</a:t>
+            </a:r>
+            <a:r>
+              <a:rPr lang="en-US" altLang="ko-KR" sz="1000" dirty="0" err="1">
+                <a:solidFill>
+                  <a:srgbClr val="A31515"/>
+                </a:solidFill>
+                <a:latin typeface="돋움체" panose="020B0609000101010101" pitchFamily="49" charset="-127"/>
+                <a:ea typeface="돋움체" panose="020B0609000101010101" pitchFamily="49" charset="-127"/>
+              </a:rPr>
+              <a:t>fopen</a:t>
+            </a:r>
+            <a:r>
+              <a:rPr lang="en-US" altLang="ko-KR" sz="1000" dirty="0">
+                <a:solidFill>
+                  <a:srgbClr val="A31515"/>
+                </a:solidFill>
+                <a:latin typeface="돋움체" panose="020B0609000101010101" pitchFamily="49" charset="-127"/>
+                <a:ea typeface="돋움체" panose="020B0609000101010101" pitchFamily="49" charset="-127"/>
+              </a:rPr>
+              <a:t>"</a:t>
+            </a:r>
+            <a:r>
+              <a:rPr lang="en-US" altLang="ko-KR" sz="1000" dirty="0">
+                <a:solidFill>
+                  <a:srgbClr val="000000"/>
+                </a:solidFill>
+                <a:latin typeface="돋움체" panose="020B0609000101010101" pitchFamily="49" charset="-127"/>
+                <a:ea typeface="돋움체" panose="020B0609000101010101" pitchFamily="49" charset="-127"/>
+              </a:rPr>
+              <a:t>);</a:t>
+            </a:r>
+          </a:p>
+          <a:p>
+            <a:r>
+              <a:rPr lang="en-US" altLang="ko-KR" sz="1000" dirty="0">
+                <a:solidFill>
+                  <a:srgbClr val="0000FF"/>
+                </a:solidFill>
+                <a:latin typeface="돋움체" panose="020B0609000101010101" pitchFamily="49" charset="-127"/>
+                <a:ea typeface="돋움체" panose="020B0609000101010101" pitchFamily="49" charset="-127"/>
+              </a:rPr>
+              <a:t>continue</a:t>
+            </a:r>
+            <a:r>
+              <a:rPr lang="en-US" altLang="ko-KR" sz="1000" dirty="0">
+                <a:solidFill>
+                  <a:srgbClr val="000000"/>
+                </a:solidFill>
+                <a:latin typeface="돋움체" panose="020B0609000101010101" pitchFamily="49" charset="-127"/>
+                <a:ea typeface="돋움체" panose="020B0609000101010101" pitchFamily="49" charset="-127"/>
+              </a:rPr>
+              <a:t>;</a:t>
+            </a:r>
+          </a:p>
+          <a:p>
+            <a:r>
+              <a:rPr lang="en-US" altLang="ko-KR" sz="1000" dirty="0">
+                <a:solidFill>
+                  <a:srgbClr val="000000"/>
+                </a:solidFill>
+                <a:latin typeface="돋움체" panose="020B0609000101010101" pitchFamily="49" charset="-127"/>
+                <a:ea typeface="돋움체" panose="020B0609000101010101" pitchFamily="49" charset="-127"/>
+              </a:rPr>
+              <a:t>}</a:t>
+            </a:r>
+          </a:p>
+          <a:p>
+            <a:r>
+              <a:rPr lang="en-US" altLang="ko-KR" sz="1000" dirty="0">
+                <a:solidFill>
+                  <a:srgbClr val="008000"/>
+                </a:solidFill>
+                <a:latin typeface="돋움체" panose="020B0609000101010101" pitchFamily="49" charset="-127"/>
+                <a:ea typeface="돋움체" panose="020B0609000101010101" pitchFamily="49" charset="-127"/>
+              </a:rPr>
+              <a:t>// </a:t>
+            </a:r>
+            <a:r>
+              <a:rPr lang="ko-KR" altLang="en-US" sz="1000" dirty="0">
+                <a:solidFill>
+                  <a:srgbClr val="008000"/>
+                </a:solidFill>
+                <a:latin typeface="돋움체" panose="020B0609000101010101" pitchFamily="49" charset="-127"/>
+                <a:ea typeface="돋움체" panose="020B0609000101010101" pitchFamily="49" charset="-127"/>
+              </a:rPr>
+              <a:t>출력할 파일이 </a:t>
+            </a:r>
+            <a:r>
+              <a:rPr lang="en-US" altLang="ko-KR" sz="1000" dirty="0">
+                <a:solidFill>
+                  <a:srgbClr val="008000"/>
+                </a:solidFill>
+                <a:latin typeface="돋움체" panose="020B0609000101010101" pitchFamily="49" charset="-127"/>
+                <a:ea typeface="돋움체" panose="020B0609000101010101" pitchFamily="49" charset="-127"/>
+              </a:rPr>
+              <a:t>1</a:t>
+            </a:r>
+            <a:r>
+              <a:rPr lang="ko-KR" altLang="en-US" sz="1000" dirty="0">
+                <a:solidFill>
+                  <a:srgbClr val="008000"/>
+                </a:solidFill>
+                <a:latin typeface="돋움체" panose="020B0609000101010101" pitchFamily="49" charset="-127"/>
+                <a:ea typeface="돋움체" panose="020B0609000101010101" pitchFamily="49" charset="-127"/>
+              </a:rPr>
+              <a:t>개가 아니고 </a:t>
+            </a:r>
+            <a:r>
+              <a:rPr lang="en-US" altLang="ko-KR" sz="1000" dirty="0">
+                <a:solidFill>
+                  <a:srgbClr val="008000"/>
+                </a:solidFill>
+                <a:latin typeface="돋움체" panose="020B0609000101010101" pitchFamily="49" charset="-127"/>
+                <a:ea typeface="돋움체" panose="020B0609000101010101" pitchFamily="49" charset="-127"/>
+              </a:rPr>
+              <a:t>-q </a:t>
+            </a:r>
+            <a:r>
+              <a:rPr lang="ko-KR" altLang="en-US" sz="1000" dirty="0">
+                <a:solidFill>
+                  <a:srgbClr val="008000"/>
+                </a:solidFill>
+                <a:latin typeface="돋움체" panose="020B0609000101010101" pitchFamily="49" charset="-127"/>
+                <a:ea typeface="돋움체" panose="020B0609000101010101" pitchFamily="49" charset="-127"/>
+              </a:rPr>
+              <a:t>옵션이 </a:t>
+            </a:r>
+            <a:r>
+              <a:rPr lang="ko-KR" altLang="en-US" sz="1000" dirty="0" err="1">
+                <a:solidFill>
+                  <a:srgbClr val="008000"/>
+                </a:solidFill>
+                <a:latin typeface="돋움체" panose="020B0609000101010101" pitchFamily="49" charset="-127"/>
+                <a:ea typeface="돋움체" panose="020B0609000101010101" pitchFamily="49" charset="-127"/>
+              </a:rPr>
+              <a:t>아닐시</a:t>
+            </a:r>
+            <a:endParaRPr lang="ko-KR" altLang="en-US" sz="1000" dirty="0">
+              <a:solidFill>
+                <a:srgbClr val="000000"/>
+              </a:solidFill>
+              <a:latin typeface="돋움체" panose="020B0609000101010101" pitchFamily="49" charset="-127"/>
+              <a:ea typeface="돋움체" panose="020B0609000101010101" pitchFamily="49" charset="-127"/>
+            </a:endParaRPr>
+          </a:p>
+          <a:p>
+            <a:r>
+              <a:rPr lang="en-US" altLang="ko-KR" sz="1000" dirty="0">
+                <a:solidFill>
+                  <a:srgbClr val="008000"/>
+                </a:solidFill>
+                <a:latin typeface="돋움체" panose="020B0609000101010101" pitchFamily="49" charset="-127"/>
+                <a:ea typeface="돋움체" panose="020B0609000101010101" pitchFamily="49" charset="-127"/>
+              </a:rPr>
+              <a:t>// </a:t>
+            </a:r>
+            <a:r>
+              <a:rPr lang="ko-KR" altLang="en-US" sz="1000" dirty="0">
+                <a:solidFill>
+                  <a:srgbClr val="008000"/>
+                </a:solidFill>
+                <a:latin typeface="돋움체" panose="020B0609000101010101" pitchFamily="49" charset="-127"/>
+                <a:ea typeface="돋움체" panose="020B0609000101010101" pitchFamily="49" charset="-127"/>
+              </a:rPr>
+              <a:t>파일명 출력</a:t>
+            </a:r>
+            <a:endParaRPr lang="ko-KR" altLang="en-US" sz="1000" dirty="0">
+              <a:solidFill>
+                <a:srgbClr val="000000"/>
+              </a:solidFill>
+              <a:latin typeface="돋움체" panose="020B0609000101010101" pitchFamily="49" charset="-127"/>
+              <a:ea typeface="돋움체" panose="020B0609000101010101" pitchFamily="49" charset="-127"/>
+            </a:endParaRPr>
+          </a:p>
+          <a:p>
+            <a:r>
+              <a:rPr lang="en-US" altLang="ko-KR" sz="1000" dirty="0">
+                <a:solidFill>
+                  <a:srgbClr val="0000FF"/>
+                </a:solidFill>
+                <a:latin typeface="돋움체" panose="020B0609000101010101" pitchFamily="49" charset="-127"/>
+                <a:ea typeface="돋움체" panose="020B0609000101010101" pitchFamily="49" charset="-127"/>
+              </a:rPr>
+              <a:t>if</a:t>
+            </a:r>
+            <a:r>
+              <a:rPr lang="en-US" altLang="ko-KR" sz="1000" dirty="0">
+                <a:solidFill>
+                  <a:srgbClr val="000000"/>
+                </a:solidFill>
+                <a:latin typeface="돋움체" panose="020B0609000101010101" pitchFamily="49" charset="-127"/>
+                <a:ea typeface="돋움체" panose="020B0609000101010101" pitchFamily="49" charset="-127"/>
+              </a:rPr>
+              <a:t> (!(</a:t>
+            </a:r>
+            <a:r>
+              <a:rPr lang="en-US" altLang="ko-KR" sz="1000" dirty="0" err="1">
+                <a:solidFill>
+                  <a:srgbClr val="000000"/>
+                </a:solidFill>
+                <a:latin typeface="돋움체" panose="020B0609000101010101" pitchFamily="49" charset="-127"/>
+                <a:ea typeface="돋움체" panose="020B0609000101010101" pitchFamily="49" charset="-127"/>
+              </a:rPr>
+              <a:t>argc</a:t>
+            </a:r>
+            <a:r>
+              <a:rPr lang="en-US" altLang="ko-KR" sz="1000" dirty="0">
+                <a:solidFill>
+                  <a:srgbClr val="000000"/>
+                </a:solidFill>
+                <a:latin typeface="돋움체" panose="020B0609000101010101" pitchFamily="49" charset="-127"/>
+                <a:ea typeface="돋움체" panose="020B0609000101010101" pitchFamily="49" charset="-127"/>
+              </a:rPr>
+              <a:t> - </a:t>
+            </a:r>
+            <a:r>
+              <a:rPr lang="en-US" altLang="ko-KR" sz="1000" dirty="0" err="1">
+                <a:solidFill>
+                  <a:srgbClr val="000000"/>
+                </a:solidFill>
+                <a:latin typeface="돋움체" panose="020B0609000101010101" pitchFamily="49" charset="-127"/>
+                <a:ea typeface="돋움체" panose="020B0609000101010101" pitchFamily="49" charset="-127"/>
+              </a:rPr>
+              <a:t>optind</a:t>
+            </a:r>
+            <a:r>
+              <a:rPr lang="en-US" altLang="ko-KR" sz="1000" dirty="0">
+                <a:solidFill>
+                  <a:srgbClr val="000000"/>
+                </a:solidFill>
+                <a:latin typeface="돋움체" panose="020B0609000101010101" pitchFamily="49" charset="-127"/>
+                <a:ea typeface="돋움체" panose="020B0609000101010101" pitchFamily="49" charset="-127"/>
+              </a:rPr>
+              <a:t> == 1) &amp;&amp; !</a:t>
+            </a:r>
+            <a:r>
+              <a:rPr lang="en-US" altLang="ko-KR" sz="1000" dirty="0" err="1">
+                <a:solidFill>
+                  <a:srgbClr val="000000"/>
+                </a:solidFill>
+                <a:latin typeface="돋움체" panose="020B0609000101010101" pitchFamily="49" charset="-127"/>
+                <a:ea typeface="돋움체" panose="020B0609000101010101" pitchFamily="49" charset="-127"/>
+              </a:rPr>
+              <a:t>quiet_mode</a:t>
+            </a:r>
+            <a:r>
+              <a:rPr lang="en-US" altLang="ko-KR" sz="1000" dirty="0">
+                <a:solidFill>
+                  <a:srgbClr val="000000"/>
+                </a:solidFill>
+                <a:latin typeface="돋움체" panose="020B0609000101010101" pitchFamily="49" charset="-127"/>
+                <a:ea typeface="돋움체" panose="020B0609000101010101" pitchFamily="49" charset="-127"/>
+              </a:rPr>
+              <a:t>) </a:t>
+            </a:r>
+            <a:r>
+              <a:rPr lang="en-US" altLang="ko-KR" sz="1000" dirty="0" err="1">
+                <a:solidFill>
+                  <a:srgbClr val="000000"/>
+                </a:solidFill>
+                <a:latin typeface="돋움체" panose="020B0609000101010101" pitchFamily="49" charset="-127"/>
+                <a:ea typeface="돋움체" panose="020B0609000101010101" pitchFamily="49" charset="-127"/>
+              </a:rPr>
+              <a:t>printf</a:t>
+            </a:r>
+            <a:r>
+              <a:rPr lang="en-US" altLang="ko-KR" sz="1000" dirty="0">
+                <a:solidFill>
+                  <a:srgbClr val="000000"/>
+                </a:solidFill>
+                <a:latin typeface="돋움체" panose="020B0609000101010101" pitchFamily="49" charset="-127"/>
+                <a:ea typeface="돋움체" panose="020B0609000101010101" pitchFamily="49" charset="-127"/>
+              </a:rPr>
+              <a:t>(</a:t>
+            </a:r>
+            <a:r>
+              <a:rPr lang="en-US" altLang="ko-KR" sz="1000" dirty="0">
+                <a:solidFill>
+                  <a:srgbClr val="A31515"/>
+                </a:solidFill>
+                <a:latin typeface="돋움체" panose="020B0609000101010101" pitchFamily="49" charset="-127"/>
+                <a:ea typeface="돋움체" panose="020B0609000101010101" pitchFamily="49" charset="-127"/>
+              </a:rPr>
+              <a:t>"==&gt; %s &lt;==\n"</a:t>
+            </a:r>
+            <a:r>
+              <a:rPr lang="en-US" altLang="ko-KR" sz="1000" dirty="0">
+                <a:solidFill>
+                  <a:srgbClr val="000000"/>
+                </a:solidFill>
+                <a:latin typeface="돋움체" panose="020B0609000101010101" pitchFamily="49" charset="-127"/>
+                <a:ea typeface="돋움체" panose="020B0609000101010101" pitchFamily="49" charset="-127"/>
+              </a:rPr>
+              <a:t>, </a:t>
+            </a:r>
+            <a:r>
+              <a:rPr lang="en-US" altLang="ko-KR" sz="1000" dirty="0" err="1">
+                <a:solidFill>
+                  <a:srgbClr val="000000"/>
+                </a:solidFill>
+                <a:latin typeface="돋움체" panose="020B0609000101010101" pitchFamily="49" charset="-127"/>
+                <a:ea typeface="돋움체" panose="020B0609000101010101" pitchFamily="49" charset="-127"/>
+              </a:rPr>
+              <a:t>argv</a:t>
+            </a:r>
+            <a:r>
+              <a:rPr lang="en-US" altLang="ko-KR" sz="1000" dirty="0">
+                <a:solidFill>
+                  <a:srgbClr val="000000"/>
+                </a:solidFill>
+                <a:latin typeface="돋움체" panose="020B0609000101010101" pitchFamily="49" charset="-127"/>
+                <a:ea typeface="돋움체" panose="020B0609000101010101" pitchFamily="49" charset="-127"/>
+              </a:rPr>
+              <a:t>[</a:t>
+            </a:r>
+            <a:r>
+              <a:rPr lang="en-US" altLang="ko-KR" sz="1000" dirty="0" err="1">
+                <a:solidFill>
+                  <a:srgbClr val="000000"/>
+                </a:solidFill>
+                <a:latin typeface="돋움체" panose="020B0609000101010101" pitchFamily="49" charset="-127"/>
+                <a:ea typeface="돋움체" panose="020B0609000101010101" pitchFamily="49" charset="-127"/>
+              </a:rPr>
+              <a:t>i</a:t>
+            </a:r>
+            <a:r>
+              <a:rPr lang="en-US" altLang="ko-KR" sz="1000" dirty="0">
+                <a:solidFill>
+                  <a:srgbClr val="000000"/>
+                </a:solidFill>
+                <a:latin typeface="돋움체" panose="020B0609000101010101" pitchFamily="49" charset="-127"/>
+                <a:ea typeface="돋움체" panose="020B0609000101010101" pitchFamily="49" charset="-127"/>
+              </a:rPr>
+              <a:t>]);</a:t>
+            </a:r>
+          </a:p>
+          <a:p>
+            <a:r>
+              <a:rPr lang="en-US" altLang="ko-KR" sz="1000" dirty="0">
+                <a:solidFill>
+                  <a:srgbClr val="008000"/>
+                </a:solidFill>
+                <a:latin typeface="돋움체" panose="020B0609000101010101" pitchFamily="49" charset="-127"/>
+                <a:ea typeface="돋움체" panose="020B0609000101010101" pitchFamily="49" charset="-127"/>
+              </a:rPr>
+              <a:t>// n option</a:t>
+            </a:r>
+            <a:r>
+              <a:rPr lang="ko-KR" altLang="en-US" sz="1000" dirty="0">
+                <a:solidFill>
+                  <a:srgbClr val="008000"/>
+                </a:solidFill>
+                <a:latin typeface="돋움체" panose="020B0609000101010101" pitchFamily="49" charset="-127"/>
+                <a:ea typeface="돋움체" panose="020B0609000101010101" pitchFamily="49" charset="-127"/>
+              </a:rPr>
+              <a:t>인지 아닌지</a:t>
+            </a:r>
+            <a:endParaRPr lang="ko-KR" altLang="en-US" sz="1000" dirty="0">
+              <a:solidFill>
+                <a:srgbClr val="000000"/>
+              </a:solidFill>
+              <a:latin typeface="돋움체" panose="020B0609000101010101" pitchFamily="49" charset="-127"/>
+              <a:ea typeface="돋움체" panose="020B0609000101010101" pitchFamily="49" charset="-127"/>
+            </a:endParaRPr>
+          </a:p>
+          <a:p>
+            <a:r>
+              <a:rPr lang="en-US" altLang="ko-KR" sz="1000" dirty="0">
+                <a:solidFill>
+                  <a:srgbClr val="0000FF"/>
+                </a:solidFill>
+                <a:latin typeface="돋움체" panose="020B0609000101010101" pitchFamily="49" charset="-127"/>
+                <a:ea typeface="돋움체" panose="020B0609000101010101" pitchFamily="49" charset="-127"/>
+              </a:rPr>
+              <a:t>if</a:t>
+            </a:r>
+            <a:r>
+              <a:rPr lang="en-US" altLang="ko-KR" sz="1000" dirty="0">
+                <a:solidFill>
+                  <a:srgbClr val="000000"/>
+                </a:solidFill>
+                <a:latin typeface="돋움체" panose="020B0609000101010101" pitchFamily="49" charset="-127"/>
+                <a:ea typeface="돋움체" panose="020B0609000101010101" pitchFamily="49" charset="-127"/>
+              </a:rPr>
+              <a:t> (</a:t>
+            </a:r>
+            <a:r>
+              <a:rPr lang="en-US" altLang="ko-KR" sz="1000" dirty="0" err="1">
+                <a:solidFill>
+                  <a:srgbClr val="000000"/>
+                </a:solidFill>
+                <a:latin typeface="돋움체" panose="020B0609000101010101" pitchFamily="49" charset="-127"/>
+                <a:ea typeface="돋움체" panose="020B0609000101010101" pitchFamily="49" charset="-127"/>
+              </a:rPr>
+              <a:t>use_lines</a:t>
+            </a:r>
+            <a:r>
+              <a:rPr lang="en-US" altLang="ko-KR" sz="1000" dirty="0">
+                <a:solidFill>
+                  <a:srgbClr val="000000"/>
+                </a:solidFill>
+                <a:latin typeface="돋움체" panose="020B0609000101010101" pitchFamily="49" charset="-127"/>
+                <a:ea typeface="돋움체" panose="020B0609000101010101" pitchFamily="49" charset="-127"/>
+              </a:rPr>
+              <a:t>) </a:t>
+            </a:r>
+            <a:r>
+              <a:rPr lang="en-US" altLang="ko-KR" sz="1000" dirty="0" err="1">
+                <a:solidFill>
+                  <a:srgbClr val="000000"/>
+                </a:solidFill>
+                <a:latin typeface="돋움체" panose="020B0609000101010101" pitchFamily="49" charset="-127"/>
+                <a:ea typeface="돋움체" panose="020B0609000101010101" pitchFamily="49" charset="-127"/>
+              </a:rPr>
+              <a:t>print_lines</a:t>
+            </a:r>
+            <a:r>
+              <a:rPr lang="en-US" altLang="ko-KR" sz="1000" dirty="0">
+                <a:solidFill>
+                  <a:srgbClr val="000000"/>
+                </a:solidFill>
+                <a:latin typeface="돋움체" panose="020B0609000101010101" pitchFamily="49" charset="-127"/>
+                <a:ea typeface="돋움체" panose="020B0609000101010101" pitchFamily="49" charset="-127"/>
+              </a:rPr>
+              <a:t>(file);</a:t>
+            </a:r>
+          </a:p>
+          <a:p>
+            <a:r>
+              <a:rPr lang="en-US" altLang="ko-KR" sz="1000" dirty="0">
+                <a:solidFill>
+                  <a:srgbClr val="0000FF"/>
+                </a:solidFill>
+                <a:latin typeface="돋움체" panose="020B0609000101010101" pitchFamily="49" charset="-127"/>
+                <a:ea typeface="돋움체" panose="020B0609000101010101" pitchFamily="49" charset="-127"/>
+              </a:rPr>
+              <a:t>else</a:t>
+            </a:r>
+            <a:r>
+              <a:rPr lang="en-US" altLang="ko-KR" sz="1000" dirty="0">
+                <a:solidFill>
+                  <a:srgbClr val="000000"/>
+                </a:solidFill>
+                <a:latin typeface="돋움체" panose="020B0609000101010101" pitchFamily="49" charset="-127"/>
+                <a:ea typeface="돋움체" panose="020B0609000101010101" pitchFamily="49" charset="-127"/>
+              </a:rPr>
+              <a:t> </a:t>
+            </a:r>
+            <a:r>
+              <a:rPr lang="en-US" altLang="ko-KR" sz="1000" dirty="0" err="1">
+                <a:solidFill>
+                  <a:srgbClr val="000000"/>
+                </a:solidFill>
+                <a:latin typeface="돋움체" panose="020B0609000101010101" pitchFamily="49" charset="-127"/>
+                <a:ea typeface="돋움체" panose="020B0609000101010101" pitchFamily="49" charset="-127"/>
+              </a:rPr>
+              <a:t>print_bytes</a:t>
+            </a:r>
+            <a:r>
+              <a:rPr lang="en-US" altLang="ko-KR" sz="1000" dirty="0">
+                <a:solidFill>
+                  <a:srgbClr val="000000"/>
+                </a:solidFill>
+                <a:latin typeface="돋움체" panose="020B0609000101010101" pitchFamily="49" charset="-127"/>
+                <a:ea typeface="돋움체" panose="020B0609000101010101" pitchFamily="49" charset="-127"/>
+              </a:rPr>
+              <a:t>(file);</a:t>
+            </a:r>
+          </a:p>
+          <a:p>
+            <a:r>
+              <a:rPr lang="en-US" altLang="ko-KR" sz="1000" dirty="0">
+                <a:solidFill>
+                  <a:srgbClr val="008000"/>
+                </a:solidFill>
+                <a:latin typeface="돋움체" panose="020B0609000101010101" pitchFamily="49" charset="-127"/>
+                <a:ea typeface="돋움체" panose="020B0609000101010101" pitchFamily="49" charset="-127"/>
+              </a:rPr>
+              <a:t>// </a:t>
+            </a:r>
+            <a:r>
+              <a:rPr lang="ko-KR" altLang="en-US" sz="1000" dirty="0">
+                <a:solidFill>
+                  <a:srgbClr val="008000"/>
+                </a:solidFill>
+                <a:latin typeface="돋움체" panose="020B0609000101010101" pitchFamily="49" charset="-127"/>
+                <a:ea typeface="돋움체" panose="020B0609000101010101" pitchFamily="49" charset="-127"/>
+              </a:rPr>
+              <a:t>출력 파일 수가 </a:t>
+            </a:r>
+            <a:r>
+              <a:rPr lang="en-US" altLang="ko-KR" sz="1000" dirty="0">
+                <a:solidFill>
+                  <a:srgbClr val="008000"/>
+                </a:solidFill>
+                <a:latin typeface="돋움체" panose="020B0609000101010101" pitchFamily="49" charset="-127"/>
+                <a:ea typeface="돋움체" panose="020B0609000101010101" pitchFamily="49" charset="-127"/>
+              </a:rPr>
+              <a:t>1</a:t>
+            </a:r>
+            <a:r>
+              <a:rPr lang="ko-KR" altLang="en-US" sz="1000" dirty="0">
+                <a:solidFill>
+                  <a:srgbClr val="008000"/>
+                </a:solidFill>
+                <a:latin typeface="돋움체" panose="020B0609000101010101" pitchFamily="49" charset="-127"/>
+                <a:ea typeface="돋움체" panose="020B0609000101010101" pitchFamily="49" charset="-127"/>
+              </a:rPr>
+              <a:t>개이고 </a:t>
+            </a:r>
+            <a:r>
+              <a:rPr lang="en-US" altLang="ko-KR" sz="1000" dirty="0">
+                <a:solidFill>
+                  <a:srgbClr val="008000"/>
+                </a:solidFill>
+                <a:latin typeface="돋움체" panose="020B0609000101010101" pitchFamily="49" charset="-127"/>
+                <a:ea typeface="돋움체" panose="020B0609000101010101" pitchFamily="49" charset="-127"/>
+              </a:rPr>
+              <a:t>q option</a:t>
+            </a:r>
+            <a:r>
+              <a:rPr lang="ko-KR" altLang="en-US" sz="1000" dirty="0">
+                <a:solidFill>
+                  <a:srgbClr val="008000"/>
+                </a:solidFill>
+                <a:latin typeface="돋움체" panose="020B0609000101010101" pitchFamily="49" charset="-127"/>
+                <a:ea typeface="돋움체" panose="020B0609000101010101" pitchFamily="49" charset="-127"/>
+              </a:rPr>
+              <a:t>이 아닐 경우</a:t>
+            </a:r>
+            <a:endParaRPr lang="ko-KR" altLang="en-US" sz="1000" dirty="0">
+              <a:solidFill>
+                <a:srgbClr val="000000"/>
+              </a:solidFill>
+              <a:latin typeface="돋움체" panose="020B0609000101010101" pitchFamily="49" charset="-127"/>
+              <a:ea typeface="돋움체" panose="020B0609000101010101" pitchFamily="49" charset="-127"/>
+            </a:endParaRPr>
+          </a:p>
+          <a:p>
+            <a:r>
+              <a:rPr lang="en-US" altLang="ko-KR" sz="1000" dirty="0">
+                <a:solidFill>
+                  <a:srgbClr val="0000FF"/>
+                </a:solidFill>
+                <a:latin typeface="돋움체" panose="020B0609000101010101" pitchFamily="49" charset="-127"/>
+                <a:ea typeface="돋움체" panose="020B0609000101010101" pitchFamily="49" charset="-127"/>
+              </a:rPr>
+              <a:t>if</a:t>
+            </a:r>
+            <a:r>
+              <a:rPr lang="en-US" altLang="ko-KR" sz="1000" dirty="0">
+                <a:solidFill>
+                  <a:srgbClr val="000000"/>
+                </a:solidFill>
+                <a:latin typeface="돋움체" panose="020B0609000101010101" pitchFamily="49" charset="-127"/>
+                <a:ea typeface="돋움체" panose="020B0609000101010101" pitchFamily="49" charset="-127"/>
+              </a:rPr>
+              <a:t> ((</a:t>
+            </a:r>
+            <a:r>
+              <a:rPr lang="en-US" altLang="ko-KR" sz="1000" dirty="0" err="1">
+                <a:solidFill>
+                  <a:srgbClr val="000000"/>
+                </a:solidFill>
+                <a:latin typeface="돋움체" panose="020B0609000101010101" pitchFamily="49" charset="-127"/>
+                <a:ea typeface="돋움체" panose="020B0609000101010101" pitchFamily="49" charset="-127"/>
+              </a:rPr>
+              <a:t>i</a:t>
+            </a:r>
+            <a:r>
+              <a:rPr lang="en-US" altLang="ko-KR" sz="1000" dirty="0">
+                <a:solidFill>
+                  <a:srgbClr val="000000"/>
+                </a:solidFill>
+                <a:latin typeface="돋움체" panose="020B0609000101010101" pitchFamily="49" charset="-127"/>
+                <a:ea typeface="돋움체" panose="020B0609000101010101" pitchFamily="49" charset="-127"/>
+              </a:rPr>
+              <a:t> != </a:t>
+            </a:r>
+            <a:r>
+              <a:rPr lang="en-US" altLang="ko-KR" sz="1000" dirty="0" err="1">
+                <a:solidFill>
+                  <a:srgbClr val="000000"/>
+                </a:solidFill>
+                <a:latin typeface="돋움체" panose="020B0609000101010101" pitchFamily="49" charset="-127"/>
+                <a:ea typeface="돋움체" panose="020B0609000101010101" pitchFamily="49" charset="-127"/>
+              </a:rPr>
+              <a:t>argc</a:t>
+            </a:r>
+            <a:r>
+              <a:rPr lang="en-US" altLang="ko-KR" sz="1000" dirty="0">
+                <a:solidFill>
+                  <a:srgbClr val="000000"/>
+                </a:solidFill>
+                <a:latin typeface="돋움체" panose="020B0609000101010101" pitchFamily="49" charset="-127"/>
+                <a:ea typeface="돋움체" panose="020B0609000101010101" pitchFamily="49" charset="-127"/>
+              </a:rPr>
+              <a:t> - 1) &amp;&amp; !</a:t>
+            </a:r>
+            <a:r>
+              <a:rPr lang="en-US" altLang="ko-KR" sz="1000" dirty="0" err="1">
+                <a:solidFill>
+                  <a:srgbClr val="000000"/>
+                </a:solidFill>
+                <a:latin typeface="돋움체" panose="020B0609000101010101" pitchFamily="49" charset="-127"/>
+                <a:ea typeface="돋움체" panose="020B0609000101010101" pitchFamily="49" charset="-127"/>
+              </a:rPr>
+              <a:t>quiet_mode</a:t>
+            </a:r>
+            <a:r>
+              <a:rPr lang="en-US" altLang="ko-KR" sz="1000" dirty="0">
+                <a:solidFill>
+                  <a:srgbClr val="000000"/>
+                </a:solidFill>
+                <a:latin typeface="돋움체" panose="020B0609000101010101" pitchFamily="49" charset="-127"/>
+                <a:ea typeface="돋움체" panose="020B0609000101010101" pitchFamily="49" charset="-127"/>
+              </a:rPr>
+              <a:t>) </a:t>
+            </a:r>
+            <a:r>
+              <a:rPr lang="en-US" altLang="ko-KR" sz="1000" dirty="0" err="1">
+                <a:solidFill>
+                  <a:srgbClr val="000000"/>
+                </a:solidFill>
+                <a:latin typeface="돋움체" panose="020B0609000101010101" pitchFamily="49" charset="-127"/>
+                <a:ea typeface="돋움체" panose="020B0609000101010101" pitchFamily="49" charset="-127"/>
+              </a:rPr>
+              <a:t>printf</a:t>
+            </a:r>
+            <a:r>
+              <a:rPr lang="en-US" altLang="ko-KR" sz="1000" dirty="0">
+                <a:solidFill>
+                  <a:srgbClr val="000000"/>
+                </a:solidFill>
+                <a:latin typeface="돋움체" panose="020B0609000101010101" pitchFamily="49" charset="-127"/>
+                <a:ea typeface="돋움체" panose="020B0609000101010101" pitchFamily="49" charset="-127"/>
+              </a:rPr>
+              <a:t>(</a:t>
+            </a:r>
+            <a:r>
+              <a:rPr lang="en-US" altLang="ko-KR" sz="1000" dirty="0">
+                <a:solidFill>
+                  <a:srgbClr val="A31515"/>
+                </a:solidFill>
+                <a:latin typeface="돋움체" panose="020B0609000101010101" pitchFamily="49" charset="-127"/>
+                <a:ea typeface="돋움체" panose="020B0609000101010101" pitchFamily="49" charset="-127"/>
+              </a:rPr>
+              <a:t>"\n"</a:t>
+            </a:r>
+            <a:r>
+              <a:rPr lang="en-US" altLang="ko-KR" sz="1000" dirty="0">
+                <a:solidFill>
+                  <a:srgbClr val="000000"/>
+                </a:solidFill>
+                <a:latin typeface="돋움체" panose="020B0609000101010101" pitchFamily="49" charset="-127"/>
+                <a:ea typeface="돋움체" panose="020B0609000101010101" pitchFamily="49" charset="-127"/>
+              </a:rPr>
+              <a:t>);</a:t>
+            </a:r>
+          </a:p>
+          <a:p>
+            <a:r>
+              <a:rPr lang="en-US" altLang="ko-KR" sz="1000" dirty="0" err="1">
+                <a:solidFill>
+                  <a:srgbClr val="000000"/>
+                </a:solidFill>
+                <a:latin typeface="돋움체" panose="020B0609000101010101" pitchFamily="49" charset="-127"/>
+                <a:ea typeface="돋움체" panose="020B0609000101010101" pitchFamily="49" charset="-127"/>
+              </a:rPr>
+              <a:t>fclose</a:t>
+            </a:r>
+            <a:r>
+              <a:rPr lang="en-US" altLang="ko-KR" sz="1000" dirty="0">
+                <a:solidFill>
+                  <a:srgbClr val="000000"/>
+                </a:solidFill>
+                <a:latin typeface="돋움체" panose="020B0609000101010101" pitchFamily="49" charset="-127"/>
+                <a:ea typeface="돋움체" panose="020B0609000101010101" pitchFamily="49" charset="-127"/>
+              </a:rPr>
+              <a:t>(file);</a:t>
+            </a:r>
+          </a:p>
+          <a:p>
+            <a:r>
+              <a:rPr lang="en-US" altLang="ko-KR" sz="1000" dirty="0">
+                <a:solidFill>
+                  <a:srgbClr val="000000"/>
+                </a:solidFill>
+                <a:latin typeface="돋움체" panose="020B0609000101010101" pitchFamily="49" charset="-127"/>
+                <a:ea typeface="돋움체" panose="020B0609000101010101" pitchFamily="49" charset="-127"/>
+              </a:rPr>
+              <a:t>}</a:t>
+            </a:r>
+          </a:p>
+          <a:p>
+            <a:r>
+              <a:rPr lang="en-US" altLang="ko-KR" sz="1000" dirty="0">
+                <a:solidFill>
+                  <a:srgbClr val="000000"/>
+                </a:solidFill>
+                <a:latin typeface="돋움체" panose="020B0609000101010101" pitchFamily="49" charset="-127"/>
+                <a:ea typeface="돋움체" panose="020B0609000101010101" pitchFamily="49" charset="-127"/>
+              </a:rPr>
+              <a:t>}</a:t>
+            </a:r>
+          </a:p>
+          <a:p>
+            <a:endParaRPr lang="ko-KR" altLang="en-US" sz="1000" dirty="0">
+              <a:solidFill>
+                <a:srgbClr val="000000"/>
+              </a:solidFill>
+              <a:latin typeface="돋움체" panose="020B0609000101010101" pitchFamily="49" charset="-127"/>
+              <a:ea typeface="돋움체" panose="020B0609000101010101" pitchFamily="49" charset="-127"/>
+            </a:endParaRPr>
+          </a:p>
+          <a:p>
+            <a:r>
+              <a:rPr lang="en-US" altLang="ko-KR" sz="1000" dirty="0">
+                <a:solidFill>
+                  <a:srgbClr val="0000FF"/>
+                </a:solidFill>
+                <a:latin typeface="돋움체" panose="020B0609000101010101" pitchFamily="49" charset="-127"/>
+                <a:ea typeface="돋움체" panose="020B0609000101010101" pitchFamily="49" charset="-127"/>
+              </a:rPr>
+              <a:t>return</a:t>
+            </a:r>
+            <a:r>
+              <a:rPr lang="en-US" altLang="ko-KR" sz="1000" dirty="0">
+                <a:solidFill>
+                  <a:srgbClr val="000000"/>
+                </a:solidFill>
+                <a:latin typeface="돋움체" panose="020B0609000101010101" pitchFamily="49" charset="-127"/>
+                <a:ea typeface="돋움체" panose="020B0609000101010101" pitchFamily="49" charset="-127"/>
+              </a:rPr>
+              <a:t> 0;</a:t>
+            </a:r>
+          </a:p>
+          <a:p>
+            <a:r>
+              <a:rPr lang="en-US" altLang="ko-KR" sz="1000" dirty="0">
+                <a:solidFill>
+                  <a:srgbClr val="000000"/>
+                </a:solidFill>
+                <a:latin typeface="돋움체" panose="020B0609000101010101" pitchFamily="49" charset="-127"/>
+                <a:ea typeface="돋움체" panose="020B0609000101010101" pitchFamily="49" charset="-127"/>
+              </a:rPr>
+              <a:t>}</a:t>
+            </a:r>
+            <a:endParaRPr lang="ko-KR" altLang="en-US" sz="1000" dirty="0"/>
           </a:p>
         </p:txBody>
       </p:sp>
@@ -4092,6 +6633,721 @@
           <p:cNvPr id="2" name="제목 1">
             <a:extLst>
               <a:ext uri="{FF2B5EF4-FFF2-40B4-BE49-F238E27FC236}">
+                <a16:creationId xmlns:a16="http://schemas.microsoft.com/office/drawing/2014/main" id="{73A311C9-046D-BF8B-B43B-D5A312CD03C1}"/>
+              </a:ext>
+            </a:extLst>
+          </p:cNvPr>
+          <p:cNvSpPr>
+            <a:spLocks noGrp="1"/>
+          </p:cNvSpPr>
+          <p:nvPr>
+            <p:ph type="title"/>
+          </p:nvPr>
+        </p:nvSpPr>
+        <p:spPr/>
+        <p:txBody>
+          <a:bodyPr/>
+          <a:lstStyle/>
+          <a:p>
+            <a:r>
+              <a:rPr lang="en-US" altLang="ko-KR" dirty="0" err="1"/>
+              <a:t>myhead.c</a:t>
+            </a:r>
+            <a:r>
+              <a:rPr lang="ko-KR" altLang="en-US" dirty="0"/>
+              <a:t> </a:t>
+            </a:r>
+            <a:r>
+              <a:rPr lang="en-US" altLang="ko-KR" dirty="0"/>
+              <a:t>(2) – n, c option </a:t>
+            </a:r>
+            <a:r>
+              <a:rPr lang="ko-KR" altLang="en-US" dirty="0"/>
+              <a:t>출력</a:t>
+            </a:r>
+          </a:p>
+        </p:txBody>
+      </p:sp>
+      <p:sp>
+        <p:nvSpPr>
+          <p:cNvPr id="4" name="TextBox 3">
+            <a:extLst>
+              <a:ext uri="{FF2B5EF4-FFF2-40B4-BE49-F238E27FC236}">
+                <a16:creationId xmlns:a16="http://schemas.microsoft.com/office/drawing/2014/main" id="{C70426F8-A4DF-5B59-E696-8DCD608F1F9A}"/>
+              </a:ext>
+            </a:extLst>
+          </p:cNvPr>
+          <p:cNvSpPr txBox="1"/>
+          <p:nvPr/>
+        </p:nvSpPr>
+        <p:spPr>
+          <a:xfrm>
+            <a:off x="838200" y="1691561"/>
+            <a:ext cx="9302547" cy="4801314"/>
+          </a:xfrm>
+          <a:prstGeom prst="rect">
+            <a:avLst/>
+          </a:prstGeom>
+          <a:noFill/>
+        </p:spPr>
+        <p:txBody>
+          <a:bodyPr wrap="none" rtlCol="0">
+            <a:spAutoFit/>
+          </a:bodyPr>
+          <a:lstStyle/>
+          <a:p>
+            <a:r>
+              <a:rPr lang="en-US" altLang="ko-KR" sz="1800" dirty="0">
+                <a:solidFill>
+                  <a:srgbClr val="008000"/>
+                </a:solidFill>
+                <a:latin typeface="돋움체" panose="020B0609000101010101" pitchFamily="49" charset="-127"/>
+                <a:ea typeface="돋움체" panose="020B0609000101010101" pitchFamily="49" charset="-127"/>
+              </a:rPr>
+              <a:t>// n option (</a:t>
+            </a:r>
+            <a:r>
+              <a:rPr lang="ko-KR" altLang="en-US" sz="1800" dirty="0">
+                <a:solidFill>
+                  <a:srgbClr val="008000"/>
+                </a:solidFill>
+                <a:latin typeface="돋움체" panose="020B0609000101010101" pitchFamily="49" charset="-127"/>
+                <a:ea typeface="돋움체" panose="020B0609000101010101" pitchFamily="49" charset="-127"/>
+              </a:rPr>
+              <a:t>지정된 라인 수만큼 읽기</a:t>
+            </a:r>
+            <a:r>
+              <a:rPr lang="en-US" altLang="ko-KR" sz="1800" dirty="0">
+                <a:solidFill>
+                  <a:srgbClr val="008000"/>
+                </a:solidFill>
+                <a:latin typeface="돋움체" panose="020B0609000101010101" pitchFamily="49" charset="-127"/>
+                <a:ea typeface="돋움체" panose="020B0609000101010101" pitchFamily="49" charset="-127"/>
+              </a:rPr>
+              <a:t>)</a:t>
+            </a:r>
+            <a:endParaRPr lang="ko-KR" altLang="en-US" sz="1800" dirty="0">
+              <a:solidFill>
+                <a:srgbClr val="000000"/>
+              </a:solidFill>
+              <a:latin typeface="돋움체" panose="020B0609000101010101" pitchFamily="49" charset="-127"/>
+              <a:ea typeface="돋움체" panose="020B0609000101010101" pitchFamily="49" charset="-127"/>
+            </a:endParaRPr>
+          </a:p>
+          <a:p>
+            <a:r>
+              <a:rPr lang="en-US" altLang="ko-KR" sz="1800" dirty="0">
+                <a:solidFill>
+                  <a:srgbClr val="0000FF"/>
+                </a:solidFill>
+                <a:latin typeface="돋움체" panose="020B0609000101010101" pitchFamily="49" charset="-127"/>
+                <a:ea typeface="돋움체" panose="020B0609000101010101" pitchFamily="49" charset="-127"/>
+              </a:rPr>
+              <a:t>void</a:t>
+            </a:r>
+            <a:r>
+              <a:rPr lang="en-US" altLang="ko-KR" sz="1800" dirty="0">
+                <a:solidFill>
+                  <a:srgbClr val="000000"/>
+                </a:solidFill>
+                <a:latin typeface="돋움체" panose="020B0609000101010101" pitchFamily="49" charset="-127"/>
+                <a:ea typeface="돋움체" panose="020B0609000101010101" pitchFamily="49" charset="-127"/>
+              </a:rPr>
+              <a:t> </a:t>
+            </a:r>
+            <a:r>
+              <a:rPr lang="en-US" altLang="ko-KR" sz="1800" dirty="0" err="1">
+                <a:solidFill>
+                  <a:srgbClr val="000000"/>
+                </a:solidFill>
+                <a:latin typeface="돋움체" panose="020B0609000101010101" pitchFamily="49" charset="-127"/>
+                <a:ea typeface="돋움체" panose="020B0609000101010101" pitchFamily="49" charset="-127"/>
+              </a:rPr>
+              <a:t>print_lines</a:t>
+            </a:r>
+            <a:r>
+              <a:rPr lang="en-US" altLang="ko-KR" sz="1800" dirty="0">
+                <a:solidFill>
+                  <a:srgbClr val="000000"/>
+                </a:solidFill>
+                <a:latin typeface="돋움체" panose="020B0609000101010101" pitchFamily="49" charset="-127"/>
+                <a:ea typeface="돋움체" panose="020B0609000101010101" pitchFamily="49" charset="-127"/>
+              </a:rPr>
+              <a:t>(FILE* file){</a:t>
+            </a:r>
+          </a:p>
+          <a:p>
+            <a:r>
+              <a:rPr lang="en-US" altLang="ko-KR" sz="1800" dirty="0">
+                <a:solidFill>
+                  <a:srgbClr val="0000FF"/>
+                </a:solidFill>
+                <a:latin typeface="돋움체" panose="020B0609000101010101" pitchFamily="49" charset="-127"/>
+                <a:ea typeface="돋움체" panose="020B0609000101010101" pitchFamily="49" charset="-127"/>
+              </a:rPr>
+              <a:t>char</a:t>
+            </a:r>
+            <a:r>
+              <a:rPr lang="en-US" altLang="ko-KR" sz="1800" dirty="0">
+                <a:solidFill>
+                  <a:srgbClr val="000000"/>
+                </a:solidFill>
+                <a:latin typeface="돋움체" panose="020B0609000101010101" pitchFamily="49" charset="-127"/>
+                <a:ea typeface="돋움체" panose="020B0609000101010101" pitchFamily="49" charset="-127"/>
+              </a:rPr>
+              <a:t> buffer[BUFSIZ];</a:t>
+            </a:r>
+          </a:p>
+          <a:p>
+            <a:r>
+              <a:rPr lang="en-US" altLang="ko-KR" sz="1800" dirty="0">
+                <a:solidFill>
+                  <a:srgbClr val="0000FF"/>
+                </a:solidFill>
+                <a:latin typeface="돋움체" panose="020B0609000101010101" pitchFamily="49" charset="-127"/>
+                <a:ea typeface="돋움체" panose="020B0609000101010101" pitchFamily="49" charset="-127"/>
+              </a:rPr>
+              <a:t>int</a:t>
+            </a:r>
+            <a:r>
+              <a:rPr lang="en-US" altLang="ko-KR" sz="1800" dirty="0">
+                <a:solidFill>
+                  <a:srgbClr val="000000"/>
+                </a:solidFill>
+                <a:latin typeface="돋움체" panose="020B0609000101010101" pitchFamily="49" charset="-127"/>
+                <a:ea typeface="돋움체" panose="020B0609000101010101" pitchFamily="49" charset="-127"/>
+              </a:rPr>
+              <a:t> </a:t>
+            </a:r>
+            <a:r>
+              <a:rPr lang="en-US" altLang="ko-KR" sz="1800" dirty="0" err="1">
+                <a:solidFill>
+                  <a:srgbClr val="000000"/>
+                </a:solidFill>
+                <a:latin typeface="돋움체" panose="020B0609000101010101" pitchFamily="49" charset="-127"/>
+                <a:ea typeface="돋움체" panose="020B0609000101010101" pitchFamily="49" charset="-127"/>
+              </a:rPr>
+              <a:t>line_count</a:t>
+            </a:r>
+            <a:r>
+              <a:rPr lang="en-US" altLang="ko-KR" sz="1800" dirty="0">
+                <a:solidFill>
+                  <a:srgbClr val="000000"/>
+                </a:solidFill>
+                <a:latin typeface="돋움체" panose="020B0609000101010101" pitchFamily="49" charset="-127"/>
+                <a:ea typeface="돋움체" panose="020B0609000101010101" pitchFamily="49" charset="-127"/>
+              </a:rPr>
+              <a:t> = 0;</a:t>
+            </a:r>
+          </a:p>
+          <a:p>
+            <a:endParaRPr lang="ko-KR" altLang="en-US" sz="1800" dirty="0">
+              <a:solidFill>
+                <a:srgbClr val="000000"/>
+              </a:solidFill>
+              <a:latin typeface="돋움체" panose="020B0609000101010101" pitchFamily="49" charset="-127"/>
+              <a:ea typeface="돋움체" panose="020B0609000101010101" pitchFamily="49" charset="-127"/>
+            </a:endParaRPr>
+          </a:p>
+          <a:p>
+            <a:r>
+              <a:rPr lang="en-US" altLang="ko-KR" sz="1800" dirty="0">
+                <a:solidFill>
+                  <a:srgbClr val="0000FF"/>
+                </a:solidFill>
+                <a:latin typeface="돋움체" panose="020B0609000101010101" pitchFamily="49" charset="-127"/>
+                <a:ea typeface="돋움체" panose="020B0609000101010101" pitchFamily="49" charset="-127"/>
+              </a:rPr>
+              <a:t>while</a:t>
+            </a:r>
+            <a:r>
+              <a:rPr lang="en-US" altLang="ko-KR" sz="1800" dirty="0">
+                <a:solidFill>
+                  <a:srgbClr val="000000"/>
+                </a:solidFill>
+                <a:latin typeface="돋움체" panose="020B0609000101010101" pitchFamily="49" charset="-127"/>
+                <a:ea typeface="돋움체" panose="020B0609000101010101" pitchFamily="49" charset="-127"/>
+              </a:rPr>
+              <a:t> (</a:t>
+            </a:r>
+            <a:r>
+              <a:rPr lang="en-US" altLang="ko-KR" sz="1800" dirty="0" err="1">
+                <a:solidFill>
+                  <a:srgbClr val="000000"/>
+                </a:solidFill>
+                <a:latin typeface="돋움체" panose="020B0609000101010101" pitchFamily="49" charset="-127"/>
+                <a:ea typeface="돋움체" panose="020B0609000101010101" pitchFamily="49" charset="-127"/>
+              </a:rPr>
+              <a:t>fgets</a:t>
+            </a:r>
+            <a:r>
+              <a:rPr lang="en-US" altLang="ko-KR" sz="1800" dirty="0">
+                <a:solidFill>
+                  <a:srgbClr val="000000"/>
+                </a:solidFill>
+                <a:latin typeface="돋움체" panose="020B0609000101010101" pitchFamily="49" charset="-127"/>
+                <a:ea typeface="돋움체" panose="020B0609000101010101" pitchFamily="49" charset="-127"/>
+              </a:rPr>
+              <a:t>(buffer, </a:t>
+            </a:r>
+            <a:r>
+              <a:rPr lang="en-US" altLang="ko-KR" sz="1800" dirty="0" err="1">
+                <a:solidFill>
+                  <a:srgbClr val="0000FF"/>
+                </a:solidFill>
+                <a:latin typeface="돋움체" panose="020B0609000101010101" pitchFamily="49" charset="-127"/>
+                <a:ea typeface="돋움체" panose="020B0609000101010101" pitchFamily="49" charset="-127"/>
+              </a:rPr>
+              <a:t>sizeof</a:t>
+            </a:r>
+            <a:r>
+              <a:rPr lang="en-US" altLang="ko-KR" sz="1800" dirty="0">
+                <a:solidFill>
+                  <a:srgbClr val="000000"/>
+                </a:solidFill>
+                <a:latin typeface="돋움체" panose="020B0609000101010101" pitchFamily="49" charset="-127"/>
+                <a:ea typeface="돋움체" panose="020B0609000101010101" pitchFamily="49" charset="-127"/>
+              </a:rPr>
+              <a:t>(buffer), file) != NULL &amp;&amp; </a:t>
+            </a:r>
+            <a:r>
+              <a:rPr lang="en-US" altLang="ko-KR" sz="1800" dirty="0" err="1">
+                <a:solidFill>
+                  <a:srgbClr val="000000"/>
+                </a:solidFill>
+                <a:latin typeface="돋움체" panose="020B0609000101010101" pitchFamily="49" charset="-127"/>
+                <a:ea typeface="돋움체" panose="020B0609000101010101" pitchFamily="49" charset="-127"/>
+              </a:rPr>
+              <a:t>line_count</a:t>
+            </a:r>
+            <a:r>
+              <a:rPr lang="en-US" altLang="ko-KR" sz="1800" dirty="0">
+                <a:solidFill>
+                  <a:srgbClr val="000000"/>
+                </a:solidFill>
+                <a:latin typeface="돋움체" panose="020B0609000101010101" pitchFamily="49" charset="-127"/>
+                <a:ea typeface="돋움체" panose="020B0609000101010101" pitchFamily="49" charset="-127"/>
+              </a:rPr>
+              <a:t> &lt; </a:t>
+            </a:r>
+            <a:r>
+              <a:rPr lang="en-US" altLang="ko-KR" sz="1800" dirty="0" err="1">
+                <a:solidFill>
+                  <a:srgbClr val="000000"/>
+                </a:solidFill>
+                <a:latin typeface="돋움체" panose="020B0609000101010101" pitchFamily="49" charset="-127"/>
+                <a:ea typeface="돋움체" panose="020B0609000101010101" pitchFamily="49" charset="-127"/>
+              </a:rPr>
+              <a:t>num_lines</a:t>
+            </a:r>
+            <a:r>
+              <a:rPr lang="en-US" altLang="ko-KR" sz="1800" dirty="0">
+                <a:solidFill>
+                  <a:srgbClr val="000000"/>
+                </a:solidFill>
+                <a:latin typeface="돋움체" panose="020B0609000101010101" pitchFamily="49" charset="-127"/>
+                <a:ea typeface="돋움체" panose="020B0609000101010101" pitchFamily="49" charset="-127"/>
+              </a:rPr>
+              <a:t>) {</a:t>
+            </a:r>
+          </a:p>
+          <a:p>
+            <a:r>
+              <a:rPr lang="en-US" altLang="ko-KR" sz="1800" dirty="0" err="1">
+                <a:solidFill>
+                  <a:srgbClr val="000000"/>
+                </a:solidFill>
+                <a:latin typeface="돋움체" panose="020B0609000101010101" pitchFamily="49" charset="-127"/>
+                <a:ea typeface="돋움체" panose="020B0609000101010101" pitchFamily="49" charset="-127"/>
+              </a:rPr>
+              <a:t>printf</a:t>
+            </a:r>
+            <a:r>
+              <a:rPr lang="en-US" altLang="ko-KR" sz="1800" dirty="0">
+                <a:solidFill>
+                  <a:srgbClr val="000000"/>
+                </a:solidFill>
+                <a:latin typeface="돋움체" panose="020B0609000101010101" pitchFamily="49" charset="-127"/>
+                <a:ea typeface="돋움체" panose="020B0609000101010101" pitchFamily="49" charset="-127"/>
+              </a:rPr>
+              <a:t>(</a:t>
+            </a:r>
+            <a:r>
+              <a:rPr lang="en-US" altLang="ko-KR" sz="1800" dirty="0">
+                <a:solidFill>
+                  <a:srgbClr val="A31515"/>
+                </a:solidFill>
+                <a:latin typeface="돋움체" panose="020B0609000101010101" pitchFamily="49" charset="-127"/>
+                <a:ea typeface="돋움체" panose="020B0609000101010101" pitchFamily="49" charset="-127"/>
+              </a:rPr>
+              <a:t>"%s"</a:t>
+            </a:r>
+            <a:r>
+              <a:rPr lang="en-US" altLang="ko-KR" sz="1800" dirty="0">
+                <a:solidFill>
+                  <a:srgbClr val="000000"/>
+                </a:solidFill>
+                <a:latin typeface="돋움체" panose="020B0609000101010101" pitchFamily="49" charset="-127"/>
+                <a:ea typeface="돋움체" panose="020B0609000101010101" pitchFamily="49" charset="-127"/>
+              </a:rPr>
+              <a:t>, buffer);</a:t>
+            </a:r>
+          </a:p>
+          <a:p>
+            <a:r>
+              <a:rPr lang="en-US" altLang="ko-KR" sz="1800" dirty="0" err="1">
+                <a:solidFill>
+                  <a:srgbClr val="000000"/>
+                </a:solidFill>
+                <a:latin typeface="돋움체" panose="020B0609000101010101" pitchFamily="49" charset="-127"/>
+                <a:ea typeface="돋움체" panose="020B0609000101010101" pitchFamily="49" charset="-127"/>
+              </a:rPr>
+              <a:t>line_count</a:t>
+            </a:r>
+            <a:r>
+              <a:rPr lang="en-US" altLang="ko-KR" sz="1800" dirty="0">
+                <a:solidFill>
+                  <a:srgbClr val="000000"/>
+                </a:solidFill>
+                <a:latin typeface="돋움체" panose="020B0609000101010101" pitchFamily="49" charset="-127"/>
+                <a:ea typeface="돋움체" panose="020B0609000101010101" pitchFamily="49" charset="-127"/>
+              </a:rPr>
+              <a:t>++;</a:t>
+            </a:r>
+          </a:p>
+          <a:p>
+            <a:r>
+              <a:rPr lang="en-US" altLang="ko-KR" sz="1800" dirty="0">
+                <a:solidFill>
+                  <a:srgbClr val="000000"/>
+                </a:solidFill>
+                <a:latin typeface="돋움체" panose="020B0609000101010101" pitchFamily="49" charset="-127"/>
+                <a:ea typeface="돋움체" panose="020B0609000101010101" pitchFamily="49" charset="-127"/>
+              </a:rPr>
+              <a:t>}</a:t>
+            </a:r>
+          </a:p>
+          <a:p>
+            <a:r>
+              <a:rPr lang="en-US" altLang="ko-KR" sz="1800" dirty="0">
+                <a:solidFill>
+                  <a:srgbClr val="000000"/>
+                </a:solidFill>
+                <a:latin typeface="돋움체" panose="020B0609000101010101" pitchFamily="49" charset="-127"/>
+                <a:ea typeface="돋움체" panose="020B0609000101010101" pitchFamily="49" charset="-127"/>
+              </a:rPr>
+              <a:t>}</a:t>
+            </a:r>
+          </a:p>
+          <a:p>
+            <a:r>
+              <a:rPr lang="en-US" altLang="ko-KR" sz="1800" dirty="0">
+                <a:solidFill>
+                  <a:srgbClr val="008000"/>
+                </a:solidFill>
+                <a:latin typeface="돋움체" panose="020B0609000101010101" pitchFamily="49" charset="-127"/>
+                <a:ea typeface="돋움체" panose="020B0609000101010101" pitchFamily="49" charset="-127"/>
+              </a:rPr>
+              <a:t>// c option (</a:t>
+            </a:r>
+            <a:r>
+              <a:rPr lang="ko-KR" altLang="en-US" sz="1800" dirty="0">
+                <a:solidFill>
+                  <a:srgbClr val="008000"/>
+                </a:solidFill>
+                <a:latin typeface="돋움체" panose="020B0609000101010101" pitchFamily="49" charset="-127"/>
+                <a:ea typeface="돋움체" panose="020B0609000101010101" pitchFamily="49" charset="-127"/>
+              </a:rPr>
+              <a:t>지정된 바이트 수만큼 읽기</a:t>
+            </a:r>
+            <a:r>
+              <a:rPr lang="en-US" altLang="ko-KR" sz="1800" dirty="0">
+                <a:solidFill>
+                  <a:srgbClr val="008000"/>
+                </a:solidFill>
+                <a:latin typeface="돋움체" panose="020B0609000101010101" pitchFamily="49" charset="-127"/>
+                <a:ea typeface="돋움체" panose="020B0609000101010101" pitchFamily="49" charset="-127"/>
+              </a:rPr>
+              <a:t>)</a:t>
+            </a:r>
+            <a:endParaRPr lang="ko-KR" altLang="en-US" sz="1800" dirty="0">
+              <a:solidFill>
+                <a:srgbClr val="000000"/>
+              </a:solidFill>
+              <a:latin typeface="돋움체" panose="020B0609000101010101" pitchFamily="49" charset="-127"/>
+              <a:ea typeface="돋움체" panose="020B0609000101010101" pitchFamily="49" charset="-127"/>
+            </a:endParaRPr>
+          </a:p>
+          <a:p>
+            <a:r>
+              <a:rPr lang="en-US" altLang="ko-KR" sz="1800" dirty="0">
+                <a:solidFill>
+                  <a:srgbClr val="0000FF"/>
+                </a:solidFill>
+                <a:latin typeface="돋움체" panose="020B0609000101010101" pitchFamily="49" charset="-127"/>
+                <a:ea typeface="돋움체" panose="020B0609000101010101" pitchFamily="49" charset="-127"/>
+              </a:rPr>
+              <a:t>void</a:t>
+            </a:r>
+            <a:r>
+              <a:rPr lang="en-US" altLang="ko-KR" sz="1800" dirty="0">
+                <a:solidFill>
+                  <a:srgbClr val="000000"/>
+                </a:solidFill>
+                <a:latin typeface="돋움체" panose="020B0609000101010101" pitchFamily="49" charset="-127"/>
+                <a:ea typeface="돋움체" panose="020B0609000101010101" pitchFamily="49" charset="-127"/>
+              </a:rPr>
+              <a:t> </a:t>
+            </a:r>
+            <a:r>
+              <a:rPr lang="en-US" altLang="ko-KR" sz="1800" dirty="0" err="1">
+                <a:solidFill>
+                  <a:srgbClr val="000000"/>
+                </a:solidFill>
+                <a:latin typeface="돋움체" panose="020B0609000101010101" pitchFamily="49" charset="-127"/>
+                <a:ea typeface="돋움체" panose="020B0609000101010101" pitchFamily="49" charset="-127"/>
+              </a:rPr>
+              <a:t>print_bytes</a:t>
+            </a:r>
+            <a:r>
+              <a:rPr lang="en-US" altLang="ko-KR" sz="1800" dirty="0">
+                <a:solidFill>
+                  <a:srgbClr val="000000"/>
+                </a:solidFill>
+                <a:latin typeface="돋움체" panose="020B0609000101010101" pitchFamily="49" charset="-127"/>
+                <a:ea typeface="돋움체" panose="020B0609000101010101" pitchFamily="49" charset="-127"/>
+              </a:rPr>
+              <a:t>(FILE* file){</a:t>
+            </a:r>
+          </a:p>
+          <a:p>
+            <a:r>
+              <a:rPr lang="en-US" altLang="ko-KR" sz="1800" dirty="0">
+                <a:solidFill>
+                  <a:srgbClr val="0000FF"/>
+                </a:solidFill>
+                <a:latin typeface="돋움체" panose="020B0609000101010101" pitchFamily="49" charset="-127"/>
+                <a:ea typeface="돋움체" panose="020B0609000101010101" pitchFamily="49" charset="-127"/>
+              </a:rPr>
+              <a:t>char</a:t>
+            </a:r>
+            <a:r>
+              <a:rPr lang="en-US" altLang="ko-KR" sz="1800" dirty="0">
+                <a:solidFill>
+                  <a:srgbClr val="000000"/>
+                </a:solidFill>
+                <a:latin typeface="돋움체" panose="020B0609000101010101" pitchFamily="49" charset="-127"/>
+                <a:ea typeface="돋움체" panose="020B0609000101010101" pitchFamily="49" charset="-127"/>
+              </a:rPr>
+              <a:t> buffer[</a:t>
+            </a:r>
+            <a:r>
+              <a:rPr lang="en-US" altLang="ko-KR" sz="1800" dirty="0" err="1">
+                <a:solidFill>
+                  <a:srgbClr val="000000"/>
+                </a:solidFill>
+                <a:latin typeface="돋움체" panose="020B0609000101010101" pitchFamily="49" charset="-127"/>
+                <a:ea typeface="돋움체" panose="020B0609000101010101" pitchFamily="49" charset="-127"/>
+              </a:rPr>
+              <a:t>num_bytes</a:t>
+            </a:r>
+            <a:r>
+              <a:rPr lang="en-US" altLang="ko-KR" sz="1800" dirty="0">
+                <a:solidFill>
+                  <a:srgbClr val="000000"/>
+                </a:solidFill>
+                <a:latin typeface="돋움체" panose="020B0609000101010101" pitchFamily="49" charset="-127"/>
+                <a:ea typeface="돋움체" panose="020B0609000101010101" pitchFamily="49" charset="-127"/>
+              </a:rPr>
+              <a:t> + 1];</a:t>
+            </a:r>
+          </a:p>
+          <a:p>
+            <a:r>
+              <a:rPr lang="en-US" altLang="ko-KR" sz="1800" dirty="0" err="1">
+                <a:solidFill>
+                  <a:srgbClr val="000000"/>
+                </a:solidFill>
+                <a:latin typeface="돋움체" panose="020B0609000101010101" pitchFamily="49" charset="-127"/>
+                <a:ea typeface="돋움체" panose="020B0609000101010101" pitchFamily="49" charset="-127"/>
+              </a:rPr>
+              <a:t>fread</a:t>
+            </a:r>
+            <a:r>
+              <a:rPr lang="en-US" altLang="ko-KR" sz="1800" dirty="0">
+                <a:solidFill>
+                  <a:srgbClr val="000000"/>
+                </a:solidFill>
+                <a:latin typeface="돋움체" panose="020B0609000101010101" pitchFamily="49" charset="-127"/>
+                <a:ea typeface="돋움체" panose="020B0609000101010101" pitchFamily="49" charset="-127"/>
+              </a:rPr>
+              <a:t>(buffer, 1, </a:t>
+            </a:r>
+            <a:r>
+              <a:rPr lang="en-US" altLang="ko-KR" sz="1800" dirty="0" err="1">
+                <a:solidFill>
+                  <a:srgbClr val="000000"/>
+                </a:solidFill>
+                <a:latin typeface="돋움체" panose="020B0609000101010101" pitchFamily="49" charset="-127"/>
+                <a:ea typeface="돋움체" panose="020B0609000101010101" pitchFamily="49" charset="-127"/>
+              </a:rPr>
+              <a:t>num_bytes</a:t>
+            </a:r>
+            <a:r>
+              <a:rPr lang="en-US" altLang="ko-KR" sz="1800" dirty="0">
+                <a:solidFill>
+                  <a:srgbClr val="000000"/>
+                </a:solidFill>
+                <a:latin typeface="돋움체" panose="020B0609000101010101" pitchFamily="49" charset="-127"/>
+                <a:ea typeface="돋움체" panose="020B0609000101010101" pitchFamily="49" charset="-127"/>
+              </a:rPr>
+              <a:t>, file);</a:t>
+            </a:r>
+          </a:p>
+          <a:p>
+            <a:r>
+              <a:rPr lang="en-US" altLang="ko-KR" sz="1800" dirty="0">
+                <a:solidFill>
+                  <a:srgbClr val="000000"/>
+                </a:solidFill>
+                <a:latin typeface="돋움체" panose="020B0609000101010101" pitchFamily="49" charset="-127"/>
+                <a:ea typeface="돋움체" panose="020B0609000101010101" pitchFamily="49" charset="-127"/>
+              </a:rPr>
+              <a:t>buffer[</a:t>
+            </a:r>
+            <a:r>
+              <a:rPr lang="en-US" altLang="ko-KR" sz="1800" dirty="0" err="1">
+                <a:solidFill>
+                  <a:srgbClr val="000000"/>
+                </a:solidFill>
+                <a:latin typeface="돋움체" panose="020B0609000101010101" pitchFamily="49" charset="-127"/>
+                <a:ea typeface="돋움체" panose="020B0609000101010101" pitchFamily="49" charset="-127"/>
+              </a:rPr>
+              <a:t>num_bytes</a:t>
+            </a:r>
+            <a:r>
+              <a:rPr lang="en-US" altLang="ko-KR" sz="1800" dirty="0">
+                <a:solidFill>
+                  <a:srgbClr val="000000"/>
+                </a:solidFill>
+                <a:latin typeface="돋움체" panose="020B0609000101010101" pitchFamily="49" charset="-127"/>
+                <a:ea typeface="돋움체" panose="020B0609000101010101" pitchFamily="49" charset="-127"/>
+              </a:rPr>
+              <a:t>] = </a:t>
+            </a:r>
+            <a:r>
+              <a:rPr lang="en-US" altLang="ko-KR" sz="1800" dirty="0">
+                <a:solidFill>
+                  <a:srgbClr val="A31515"/>
+                </a:solidFill>
+                <a:latin typeface="돋움체" panose="020B0609000101010101" pitchFamily="49" charset="-127"/>
+                <a:ea typeface="돋움체" panose="020B0609000101010101" pitchFamily="49" charset="-127"/>
+              </a:rPr>
+              <a:t>'\0'</a:t>
+            </a:r>
+            <a:r>
+              <a:rPr lang="en-US" altLang="ko-KR" sz="1800" dirty="0">
+                <a:solidFill>
+                  <a:srgbClr val="000000"/>
+                </a:solidFill>
+                <a:latin typeface="돋움체" panose="020B0609000101010101" pitchFamily="49" charset="-127"/>
+                <a:ea typeface="돋움체" panose="020B0609000101010101" pitchFamily="49" charset="-127"/>
+              </a:rPr>
+              <a:t>;</a:t>
+            </a:r>
+          </a:p>
+          <a:p>
+            <a:r>
+              <a:rPr lang="en-US" altLang="ko-KR" sz="1800" dirty="0" err="1">
+                <a:solidFill>
+                  <a:srgbClr val="000000"/>
+                </a:solidFill>
+                <a:latin typeface="돋움체" panose="020B0609000101010101" pitchFamily="49" charset="-127"/>
+                <a:ea typeface="돋움체" panose="020B0609000101010101" pitchFamily="49" charset="-127"/>
+              </a:rPr>
+              <a:t>printf</a:t>
+            </a:r>
+            <a:r>
+              <a:rPr lang="en-US" altLang="ko-KR" sz="1800" dirty="0">
+                <a:solidFill>
+                  <a:srgbClr val="000000"/>
+                </a:solidFill>
+                <a:latin typeface="돋움체" panose="020B0609000101010101" pitchFamily="49" charset="-127"/>
+                <a:ea typeface="돋움체" panose="020B0609000101010101" pitchFamily="49" charset="-127"/>
+              </a:rPr>
+              <a:t>(</a:t>
+            </a:r>
+            <a:r>
+              <a:rPr lang="en-US" altLang="ko-KR" sz="1800" dirty="0">
+                <a:solidFill>
+                  <a:srgbClr val="A31515"/>
+                </a:solidFill>
+                <a:latin typeface="돋움체" panose="020B0609000101010101" pitchFamily="49" charset="-127"/>
+                <a:ea typeface="돋움체" panose="020B0609000101010101" pitchFamily="49" charset="-127"/>
+              </a:rPr>
+              <a:t>"%s"</a:t>
+            </a:r>
+            <a:r>
+              <a:rPr lang="en-US" altLang="ko-KR" sz="1800" dirty="0">
+                <a:solidFill>
+                  <a:srgbClr val="000000"/>
+                </a:solidFill>
+                <a:latin typeface="돋움체" panose="020B0609000101010101" pitchFamily="49" charset="-127"/>
+                <a:ea typeface="돋움체" panose="020B0609000101010101" pitchFamily="49" charset="-127"/>
+              </a:rPr>
+              <a:t>, buffer);</a:t>
+            </a:r>
+          </a:p>
+          <a:p>
+            <a:r>
+              <a:rPr lang="en-US" altLang="ko-KR" sz="1800" dirty="0">
+                <a:solidFill>
+                  <a:srgbClr val="000000"/>
+                </a:solidFill>
+                <a:latin typeface="돋움체" panose="020B0609000101010101" pitchFamily="49" charset="-127"/>
+                <a:ea typeface="돋움체" panose="020B0609000101010101" pitchFamily="49" charset="-127"/>
+              </a:rPr>
+              <a:t>}</a:t>
+            </a:r>
+            <a:endParaRPr lang="ko-KR" altLang="en-US" dirty="0"/>
+          </a:p>
+        </p:txBody>
+      </p:sp>
+    </p:spTree>
+    <p:extLst>
+      <p:ext uri="{BB962C8B-B14F-4D97-AF65-F5344CB8AC3E}">
+        <p14:creationId xmlns:p14="http://schemas.microsoft.com/office/powerpoint/2010/main" val="837533140"/>
+      </p:ext>
+    </p:extLst>
+  </p:cSld>
+  <p:clrMapOvr>
+    <a:masterClrMapping/>
+  </p:clrMapOvr>
+</p:sld>
+</file>
+
+<file path=ppt/slides/slide14.xml><?xml version="1.0" encoding="utf-8"?>
+<p:sld xmlns:a="http://schemas.openxmlformats.org/drawingml/2006/main" xmlns:r="http://schemas.openxmlformats.org/officeDocument/2006/relationships" xmlns:p="http://schemas.openxmlformats.org/presentationml/2006/main">
+  <p:cSld>
+    <p:spTree>
+      <p:nvGrpSpPr>
+        <p:cNvPr id="1" name=""/>
+        <p:cNvGrpSpPr/>
+        <p:nvPr/>
+      </p:nvGrpSpPr>
+      <p:grpSpPr>
+        <a:xfrm>
+          <a:off x="0" y="0"/>
+          <a:ext cx="0" cy="0"/>
+          <a:chOff x="0" y="0"/>
+          <a:chExt cx="0" cy="0"/>
+        </a:xfrm>
+      </p:grpSpPr>
+      <p:sp>
+        <p:nvSpPr>
+          <p:cNvPr id="2" name="제목 1">
+            <a:extLst>
+              <a:ext uri="{FF2B5EF4-FFF2-40B4-BE49-F238E27FC236}">
                 <a16:creationId xmlns:a16="http://schemas.microsoft.com/office/drawing/2014/main" id="{5035B814-2F6E-4DEE-A9AB-6763F48706ED}"/>
               </a:ext>
             </a:extLst>
@@ -4339,7 +7595,7 @@
 </p:sld>
 </file>
 
-<file path=ppt/slides/slide14.xml><?xml version="1.0" encoding="utf-8"?>
+<file path=ppt/slides/slide15.xml><?xml version="1.0" encoding="utf-8"?>
 <p:sld xmlns:a="http://schemas.openxmlformats.org/drawingml/2006/main" xmlns:r="http://schemas.openxmlformats.org/officeDocument/2006/relationships" xmlns:p="http://schemas.openxmlformats.org/presentationml/2006/main">
   <p:cSld>
     <p:spTree>
@@ -4379,7 +7635,7 @@
           <a:p>
             <a:r>
               <a:rPr lang="en-US" altLang="ko-KR" dirty="0"/>
-              <a:t>Tail options (n, c, q)</a:t>
+              <a:t>tail options (n, c, q)</a:t>
             </a:r>
             <a:endParaRPr lang="ko-KR" altLang="en-US" dirty="0"/>
           </a:p>
@@ -4652,7 +7908,7 @@
 </p:sld>
 </file>
 
-<file path=ppt/slides/slide15.xml><?xml version="1.0" encoding="utf-8"?>
+<file path=ppt/slides/slide16.xml><?xml version="1.0" encoding="utf-8"?>
 <p:sld xmlns:a="http://schemas.openxmlformats.org/drawingml/2006/main" xmlns:r="http://schemas.openxmlformats.org/officeDocument/2006/relationships" xmlns:p="http://schemas.openxmlformats.org/presentationml/2006/main">
   <p:cSld>
     <p:spTree>
@@ -7800,7 +11056,7 @@
 </p:sld>
 </file>
 
-<file path=ppt/slides/slide16.xml><?xml version="1.0" encoding="utf-8"?>
+<file path=ppt/slides/slide17.xml><?xml version="1.0" encoding="utf-8"?>
 <p:sld xmlns:a="http://schemas.openxmlformats.org/drawingml/2006/main" xmlns:r="http://schemas.openxmlformats.org/officeDocument/2006/relationships" xmlns:p="http://schemas.openxmlformats.org/presentationml/2006/main">
   <p:cSld>
     <p:spTree>
@@ -8647,7 +11903,7 @@
 </p:sld>
 </file>
 
-<file path=ppt/slides/slide17.xml><?xml version="1.0" encoding="utf-8"?>
+<file path=ppt/slides/slide18.xml><?xml version="1.0" encoding="utf-8"?>
 <p:sld xmlns:a="http://schemas.openxmlformats.org/drawingml/2006/main" xmlns:r="http://schemas.openxmlformats.org/officeDocument/2006/relationships" xmlns:p="http://schemas.openxmlformats.org/presentationml/2006/main">
   <p:cSld>
     <p:spTree>
@@ -9614,7 +12870,7 @@
 </p:sld>
 </file>
 
-<file path=ppt/slides/slide18.xml><?xml version="1.0" encoding="utf-8"?>
+<file path=ppt/slides/slide19.xml><?xml version="1.0" encoding="utf-8"?>
 <p:sld xmlns:a="http://schemas.openxmlformats.org/drawingml/2006/main" xmlns:r="http://schemas.openxmlformats.org/officeDocument/2006/relationships" xmlns:p="http://schemas.openxmlformats.org/presentationml/2006/main">
   <p:cSld>
     <p:spTree>
@@ -9652,6 +12908,10 @@
           <a:bodyPr/>
           <a:lstStyle/>
           <a:p>
+            <a:r>
+              <a:rPr lang="en-US" altLang="ko-KR" dirty="0"/>
+              <a:t>cat</a:t>
+            </a:r>
             <a:endParaRPr lang="ko-KR" altLang="en-US" dirty="0"/>
           </a:p>
         </p:txBody>
@@ -9677,10 +12937,137 @@
           <a:bodyPr/>
           <a:lstStyle/>
           <a:p>
-            <a:endParaRPr lang="ko-KR" altLang="en-US"/>
+            <a:pPr algn="l">
+              <a:buFont typeface="Arial" panose="020B0604020202020204" pitchFamily="34" charset="0"/>
+              <a:buChar char="•"/>
+            </a:pPr>
+            <a:r>
+              <a:rPr lang="en-US" altLang="ko-KR" sz="2000" b="0" i="0" dirty="0">
+                <a:effectLst/>
+                <a:latin typeface="-apple-system"/>
+              </a:rPr>
+              <a:t>"concatenate"</a:t>
+            </a:r>
+            <a:r>
+              <a:rPr lang="ko-KR" altLang="en-US" sz="2000" b="0" i="0" dirty="0">
+                <a:effectLst/>
+                <a:latin typeface="-apple-system"/>
+              </a:rPr>
+              <a:t>의 줄임말</a:t>
+            </a:r>
+          </a:p>
+          <a:p>
+            <a:pPr algn="l">
+              <a:buFont typeface="Arial" panose="020B0604020202020204" pitchFamily="34" charset="0"/>
+              <a:buChar char="•"/>
+            </a:pPr>
+            <a:r>
+              <a:rPr lang="ko-KR" altLang="en-US" sz="2000" b="0" i="0" dirty="0">
+                <a:effectLst/>
+                <a:latin typeface="-apple-system"/>
+              </a:rPr>
+              <a:t>파일의 내용을 화면에 출력하거나 여러 파일을 결합하는 데 사용되는 명령어</a:t>
+            </a:r>
+          </a:p>
+          <a:p>
+            <a:endParaRPr lang="ko-KR" altLang="en-US" dirty="0"/>
           </a:p>
         </p:txBody>
       </p:sp>
+      <p:pic>
+        <p:nvPicPr>
+          <p:cNvPr id="3074" name="Picture 2">
+            <a:extLst>
+              <a:ext uri="{FF2B5EF4-FFF2-40B4-BE49-F238E27FC236}">
+                <a16:creationId xmlns:a16="http://schemas.microsoft.com/office/drawing/2014/main" id="{C9FDD3B3-A78C-5290-F704-63F1ECB9C16F}"/>
+              </a:ext>
+            </a:extLst>
+          </p:cNvPr>
+          <p:cNvPicPr>
+            <a:picLocks noChangeAspect="1" noChangeArrowheads="1"/>
+          </p:cNvPicPr>
+          <p:nvPr/>
+        </p:nvPicPr>
+        <p:blipFill>
+          <a:blip r:embed="rId2">
+            <a:extLst>
+              <a:ext uri="{28A0092B-C50C-407E-A947-70E740481C1C}">
+                <a14:useLocalDpi xmlns:a14="http://schemas.microsoft.com/office/drawing/2010/main" val="0"/>
+              </a:ext>
+            </a:extLst>
+          </a:blip>
+          <a:srcRect/>
+          <a:stretch>
+            <a:fillRect/>
+          </a:stretch>
+        </p:blipFill>
+        <p:spPr bwMode="auto">
+          <a:xfrm>
+            <a:off x="838200" y="3077004"/>
+            <a:ext cx="7286625" cy="1047750"/>
+          </a:xfrm>
+          <a:prstGeom prst="rect">
+            <a:avLst/>
+          </a:prstGeom>
+          <a:noFill/>
+          <a:extLst>
+            <a:ext uri="{909E8E84-426E-40DD-AFC4-6F175D3DCCD1}">
+              <a14:hiddenFill xmlns:a14="http://schemas.microsoft.com/office/drawing/2010/main">
+                <a:solidFill>
+                  <a:srgbClr val="FFFFFF"/>
+                </a:solidFill>
+              </a14:hiddenFill>
+            </a:ext>
+          </a:extLst>
+        </p:spPr>
+      </p:pic>
+      <p:pic>
+        <p:nvPicPr>
+          <p:cNvPr id="3076" name="Picture 4">
+            <a:extLst>
+              <a:ext uri="{FF2B5EF4-FFF2-40B4-BE49-F238E27FC236}">
+                <a16:creationId xmlns:a16="http://schemas.microsoft.com/office/drawing/2014/main" id="{390B1C46-1FE3-2CA4-0ED5-D8B3CCB1060C}"/>
+              </a:ext>
+            </a:extLst>
+          </p:cNvPr>
+          <p:cNvPicPr>
+            <a:picLocks noChangeAspect="1" noChangeArrowheads="1"/>
+          </p:cNvPicPr>
+          <p:nvPr/>
+        </p:nvPicPr>
+        <p:blipFill>
+          <a:blip r:embed="rId3">
+            <a:extLst>
+              <a:ext uri="{28A0092B-C50C-407E-A947-70E740481C1C}">
+                <a14:useLocalDpi xmlns:a14="http://schemas.microsoft.com/office/drawing/2010/main" val="0"/>
+              </a:ext>
+            </a:extLst>
+          </a:blip>
+          <a:srcRect/>
+          <a:stretch>
+            <a:fillRect/>
+          </a:stretch>
+        </p:blipFill>
+        <p:spPr bwMode="auto">
+          <a:xfrm>
+            <a:off x="838200" y="4109285"/>
+            <a:ext cx="7496175" cy="1000125"/>
+          </a:xfrm>
+          <a:prstGeom prst="rect">
+            <a:avLst/>
+          </a:prstGeom>
+          <a:noFill/>
+          <a:extLst>
+            <a:ext uri="{909E8E84-426E-40DD-AFC4-6F175D3DCCD1}">
+              <a14:hiddenFill xmlns:a14="http://schemas.microsoft.com/office/drawing/2010/main">
+                <a:solidFill>
+                  <a:srgbClr val="FFFFFF"/>
+                </a:solidFill>
+              </a14:hiddenFill>
+            </a:ext>
+          </a:extLst>
+        </p:spPr>
+      </p:pic>
     </p:spTree>
     <p:extLst>
       <p:ext uri="{BB962C8B-B14F-4D97-AF65-F5344CB8AC3E}">

</xml_diff>